<commit_message>
slide Energie et consomations
</commit_message>
<xml_diff>
--- a/app/src/test/resources/powerpointvierge.pptx
+++ b/app/src/test/resources/powerpointvierge.pptx
@@ -1852,7 +1852,7 @@
       </p:sp>
       <p:sp>
         <p:nvSpPr>
-          <p:cNvPr id="2" name="ZoneTexte 1">
+          <p:cNvPr id="2" name="remarqueRemarque conso, facture et appro énergétique">
             <a:extLst>
               <a:ext uri="{FF2B5EF4-FFF2-40B4-BE49-F238E27FC236}">
                 <a16:creationId xmlns:a16="http://schemas.microsoft.com/office/drawing/2014/main" id="{3BA6EF77-C9D8-E88D-63A4-86032D546B75}"/>
@@ -1864,8 +1864,8 @@
         </p:nvSpPr>
         <p:spPr>
           <a:xfrm>
-            <a:off x="6604000" y="4456343"/>
-            <a:ext cx="4427144" cy="338554"/>
+            <a:off x="6332613" y="4456343"/>
+            <a:ext cx="5656187" cy="338554"/>
           </a:xfrm>
           <a:prstGeom prst="rect">
             <a:avLst/>
@@ -1911,7 +1911,7 @@
                 <a:latin typeface="Arial"/>
                 <a:cs typeface="Times New Roman"/>
               </a:rPr>
-              <a:t>Ceci est un descriptif</a:t>
+              <a:t> </a:t>
             </a:r>
           </a:p>
         </p:txBody>
@@ -4651,6 +4651,431 @@
           </a:p>
         </p:txBody>
       </p:sp>
+      <p:graphicFrame>
+        <p:nvGraphicFramePr>
+          <p:cNvPr id="6" name="tableauApprovisionnementEnergetique">
+            <a:extLst>
+              <a:ext uri="{FF2B5EF4-FFF2-40B4-BE49-F238E27FC236}">
+                <a16:creationId xmlns:a16="http://schemas.microsoft.com/office/drawing/2014/main" id="{DB581083-207E-F694-5F9A-A0D301255827}"/>
+              </a:ext>
+            </a:extLst>
+          </p:cNvPr>
+          <p:cNvGraphicFramePr>
+            <a:graphicFrameLocks noGrp="1"/>
+          </p:cNvGraphicFramePr>
+          <p:nvPr>
+            <p:extLst>
+              <p:ext uri="{D42A27DB-BD31-4B8C-83A1-F6EECF244321}">
+                <p14:modId xmlns:p14="http://schemas.microsoft.com/office/powerpoint/2010/main" val="3104430655"/>
+              </p:ext>
+            </p:extLst>
+          </p:nvPr>
+        </p:nvGraphicFramePr>
+        <p:xfrm>
+          <a:off x="6350000" y="1143000"/>
+          <a:ext cx="5638800" cy="952500"/>
+        </p:xfrm>
+        <a:graphic>
+          <a:graphicData uri="http://schemas.openxmlformats.org/drawingml/2006/table">
+            <a:tbl>
+              <a:tblPr/>
+              <a:tblGrid>
+                <a:gridCol w="1164823">
+                  <a:extLst>
+                    <a:ext uri="{9D8B030D-6E8A-4147-A177-3AD203B41FA5}">
+                      <a16:colId xmlns:a16="http://schemas.microsoft.com/office/drawing/2014/main" val="2062104135"/>
+                    </a:ext>
+                  </a:extLst>
+                </a:gridCol>
+                <a:gridCol w="2400240">
+                  <a:extLst>
+                    <a:ext uri="{9D8B030D-6E8A-4147-A177-3AD203B41FA5}">
+                      <a16:colId xmlns:a16="http://schemas.microsoft.com/office/drawing/2014/main" val="1236367479"/>
+                    </a:ext>
+                  </a:extLst>
+                </a:gridCol>
+                <a:gridCol w="1088344">
+                  <a:extLst>
+                    <a:ext uri="{9D8B030D-6E8A-4147-A177-3AD203B41FA5}">
+                      <a16:colId xmlns:a16="http://schemas.microsoft.com/office/drawing/2014/main" val="276330688"/>
+                    </a:ext>
+                  </a:extLst>
+                </a:gridCol>
+                <a:gridCol w="985393">
+                  <a:extLst>
+                    <a:ext uri="{9D8B030D-6E8A-4147-A177-3AD203B41FA5}">
+                      <a16:colId xmlns:a16="http://schemas.microsoft.com/office/drawing/2014/main" val="878808144"/>
+                    </a:ext>
+                  </a:extLst>
+                </a:gridCol>
+              </a:tblGrid>
+              <a:tr h="228600">
+                <a:tc gridSpan="4">
+                  <a:txBody>
+                    <a:bodyPr/>
+                    <a:lstStyle/>
+                    <a:p>
+                      <a:pPr algn="ctr" fontAlgn="ctr"/>
+                      <a:r>
+                        <a:rPr lang="fr-FR" sz="1400" b="1" i="0" u="none" strike="noStrike" dirty="0">
+                          <a:solidFill>
+                            <a:srgbClr val="FFFFFF"/>
+                          </a:solidFill>
+                          <a:effectLst/>
+                          <a:latin typeface="Calibri" panose="020F0502020204030204" pitchFamily="34" charset="0"/>
+                        </a:rPr>
+                        <a:t>APPROVISIONNEMENT ENERGETIQUE</a:t>
+                      </a:r>
+                    </a:p>
+                  </a:txBody>
+                  <a:tcPr marL="0" marR="0" marT="0" marB="0" anchor="ctr">
+                    <a:lnL>
+                      <a:noFill/>
+                    </a:lnL>
+                    <a:lnR>
+                      <a:noFill/>
+                    </a:lnR>
+                    <a:lnT>
+                      <a:noFill/>
+                    </a:lnT>
+                    <a:lnB>
+                      <a:noFill/>
+                    </a:lnB>
+                    <a:solidFill>
+                      <a:srgbClr val="70AD47"/>
+                    </a:solidFill>
+                  </a:tcPr>
+                </a:tc>
+                <a:tc hMerge="1">
+                  <a:txBody>
+                    <a:bodyPr/>
+                    <a:lstStyle/>
+                    <a:p>
+                      <a:endParaRPr lang="fr-FR"/>
+                    </a:p>
+                  </a:txBody>
+                  <a:tcPr/>
+                </a:tc>
+                <a:tc hMerge="1">
+                  <a:txBody>
+                    <a:bodyPr/>
+                    <a:lstStyle/>
+                    <a:p>
+                      <a:endParaRPr lang="fr-FR"/>
+                    </a:p>
+                  </a:txBody>
+                  <a:tcPr/>
+                </a:tc>
+                <a:tc hMerge="1">
+                  <a:txBody>
+                    <a:bodyPr/>
+                    <a:lstStyle/>
+                    <a:p>
+                      <a:endParaRPr lang="fr-FR"/>
+                    </a:p>
+                  </a:txBody>
+                  <a:tcPr/>
+                </a:tc>
+                <a:extLst>
+                  <a:ext uri="{0D108BD9-81ED-4DB2-BD59-A6C34878D82A}">
+                    <a16:rowId xmlns:a16="http://schemas.microsoft.com/office/drawing/2014/main" val="4242120919"/>
+                  </a:ext>
+                </a:extLst>
+              </a:tr>
+              <a:tr h="457200">
+                <a:tc>
+                  <a:txBody>
+                    <a:bodyPr/>
+                    <a:lstStyle/>
+                    <a:p>
+                      <a:pPr algn="ctr" fontAlgn="ctr"/>
+                      <a:r>
+                        <a:rPr lang="fr-FR" sz="1400" b="1" i="0" u="none" strike="noStrike">
+                          <a:solidFill>
+                            <a:srgbClr val="FFFFFF"/>
+                          </a:solidFill>
+                          <a:effectLst/>
+                          <a:latin typeface="Calibri Light" panose="020F0302020204030204" pitchFamily="34" charset="0"/>
+                        </a:rPr>
+                        <a:t>Energie</a:t>
+                      </a:r>
+                    </a:p>
+                  </a:txBody>
+                  <a:tcPr marL="0" marR="0" marT="0" marB="0" anchor="ctr">
+                    <a:lnL>
+                      <a:noFill/>
+                    </a:lnL>
+                    <a:lnR>
+                      <a:noFill/>
+                    </a:lnR>
+                    <a:lnT>
+                      <a:noFill/>
+                    </a:lnT>
+                    <a:lnB>
+                      <a:noFill/>
+                    </a:lnB>
+                    <a:solidFill>
+                      <a:srgbClr val="A9D08E"/>
+                    </a:solidFill>
+                  </a:tcPr>
+                </a:tc>
+                <a:tc>
+                  <a:txBody>
+                    <a:bodyPr/>
+                    <a:lstStyle/>
+                    <a:p>
+                      <a:pPr algn="ctr" fontAlgn="ctr"/>
+                      <a:r>
+                        <a:rPr lang="fr-FR" sz="1400" b="1" i="0" u="none" strike="noStrike" dirty="0">
+                          <a:solidFill>
+                            <a:srgbClr val="FFFFFF"/>
+                          </a:solidFill>
+                          <a:effectLst/>
+                          <a:latin typeface="Calibri Light" panose="020F0302020204030204" pitchFamily="34" charset="0"/>
+                        </a:rPr>
+                        <a:t>Nom du PDL / RAE</a:t>
+                      </a:r>
+                    </a:p>
+                  </a:txBody>
+                  <a:tcPr marL="0" marR="0" marT="0" marB="0" anchor="ctr">
+                    <a:lnL>
+                      <a:noFill/>
+                    </a:lnL>
+                    <a:lnR>
+                      <a:noFill/>
+                    </a:lnR>
+                    <a:lnT>
+                      <a:noFill/>
+                    </a:lnT>
+                    <a:lnB>
+                      <a:noFill/>
+                    </a:lnB>
+                    <a:solidFill>
+                      <a:srgbClr val="A9D08E"/>
+                    </a:solidFill>
+                  </a:tcPr>
+                </a:tc>
+                <a:tc>
+                  <a:txBody>
+                    <a:bodyPr/>
+                    <a:lstStyle/>
+                    <a:p>
+                      <a:pPr algn="ctr" fontAlgn="ctr"/>
+                      <a:r>
+                        <a:rPr lang="fr-FR" sz="1400" b="1" i="0" u="none" strike="noStrike">
+                          <a:solidFill>
+                            <a:srgbClr val="FFFFFF"/>
+                          </a:solidFill>
+                          <a:effectLst/>
+                          <a:latin typeface="Calibri Light" panose="020F0302020204030204" pitchFamily="34" charset="0"/>
+                        </a:rPr>
+                        <a:t>Puissance souscrite</a:t>
+                      </a:r>
+                    </a:p>
+                  </a:txBody>
+                  <a:tcPr marL="0" marR="0" marT="0" marB="0" anchor="ctr">
+                    <a:lnL>
+                      <a:noFill/>
+                    </a:lnL>
+                    <a:lnR>
+                      <a:noFill/>
+                    </a:lnR>
+                    <a:lnT>
+                      <a:noFill/>
+                    </a:lnT>
+                    <a:lnB>
+                      <a:noFill/>
+                    </a:lnB>
+                    <a:solidFill>
+                      <a:srgbClr val="A9D08E"/>
+                    </a:solidFill>
+                  </a:tcPr>
+                </a:tc>
+                <a:tc>
+                  <a:txBody>
+                    <a:bodyPr/>
+                    <a:lstStyle/>
+                    <a:p>
+                      <a:pPr algn="ctr" fontAlgn="ctr"/>
+                      <a:r>
+                        <a:rPr lang="fr-FR" sz="1400" b="1" i="0" u="none" strike="noStrike">
+                          <a:solidFill>
+                            <a:srgbClr val="FFFFFF"/>
+                          </a:solidFill>
+                          <a:effectLst/>
+                          <a:latin typeface="Calibri Light" panose="020F0302020204030204" pitchFamily="34" charset="0"/>
+                        </a:rPr>
+                        <a:t>Formule tarifaire</a:t>
+                      </a:r>
+                    </a:p>
+                  </a:txBody>
+                  <a:tcPr marL="0" marR="0" marT="0" marB="0" anchor="ctr">
+                    <a:lnL>
+                      <a:noFill/>
+                    </a:lnL>
+                    <a:lnR>
+                      <a:noFill/>
+                    </a:lnR>
+                    <a:lnT>
+                      <a:noFill/>
+                    </a:lnT>
+                    <a:lnB>
+                      <a:noFill/>
+                    </a:lnB>
+                    <a:solidFill>
+                      <a:srgbClr val="A9D08E"/>
+                    </a:solidFill>
+                  </a:tcPr>
+                </a:tc>
+                <a:extLst>
+                  <a:ext uri="{0D108BD9-81ED-4DB2-BD59-A6C34878D82A}">
+                    <a16:rowId xmlns:a16="http://schemas.microsoft.com/office/drawing/2014/main" val="1164603379"/>
+                  </a:ext>
+                </a:extLst>
+              </a:tr>
+              <a:tr h="266700">
+                <a:tc>
+                  <a:txBody>
+                    <a:bodyPr/>
+                    <a:lstStyle/>
+                    <a:p>
+                      <a:pPr algn="ctr" fontAlgn="ctr"/>
+                      <a:r>
+                        <a:rPr lang="fr-FR" sz="1400" b="1" i="0" u="none" strike="noStrike" dirty="0">
+                          <a:solidFill>
+                            <a:srgbClr val="222B35"/>
+                          </a:solidFill>
+                          <a:effectLst/>
+                          <a:latin typeface="Calibri Light" panose="020F0302020204030204" pitchFamily="34" charset="0"/>
+                        </a:rPr>
+                        <a:t>Electricité</a:t>
+                      </a:r>
+                    </a:p>
+                  </a:txBody>
+                  <a:tcPr marL="0" marR="0" marT="0" marB="0" anchor="ctr">
+                    <a:lnL>
+                      <a:noFill/>
+                    </a:lnL>
+                    <a:lnR>
+                      <a:noFill/>
+                    </a:lnR>
+                    <a:lnT>
+                      <a:noFill/>
+                    </a:lnT>
+                    <a:lnB>
+                      <a:noFill/>
+                    </a:lnB>
+                  </a:tcPr>
+                </a:tc>
+                <a:tc>
+                  <a:txBody>
+                    <a:bodyPr/>
+                    <a:lstStyle/>
+                    <a:p>
+                      <a:pPr algn="ctr" fontAlgn="ctr"/>
+                      <a:r>
+                        <a:rPr lang="fr-FR" sz="1300" b="0" i="0" u="none" strike="noStrike" dirty="0">
+                          <a:solidFill>
+                            <a:srgbClr val="222B35"/>
+                          </a:solidFill>
+                          <a:effectLst/>
+                          <a:latin typeface="Calibri Light" panose="020F0302020204030204" pitchFamily="34" charset="0"/>
+                        </a:rPr>
+                        <a:t>50031210892940</a:t>
+                      </a:r>
+                    </a:p>
+                  </a:txBody>
+                  <a:tcPr marL="0" marR="0" marT="0" marB="0" anchor="ctr">
+                    <a:lnL>
+                      <a:noFill/>
+                    </a:lnL>
+                    <a:lnR>
+                      <a:noFill/>
+                    </a:lnR>
+                    <a:lnT>
+                      <a:noFill/>
+                    </a:lnT>
+                    <a:lnB>
+                      <a:noFill/>
+                    </a:lnB>
+                  </a:tcPr>
+                </a:tc>
+                <a:tc>
+                  <a:txBody>
+                    <a:bodyPr/>
+                    <a:lstStyle/>
+                    <a:p>
+                      <a:pPr algn="ctr" fontAlgn="ctr"/>
+                      <a:r>
+                        <a:rPr lang="fr-FR" sz="1300" b="0" i="0" u="none" strike="noStrike">
+                          <a:solidFill>
+                            <a:srgbClr val="222B35"/>
+                          </a:solidFill>
+                          <a:effectLst/>
+                          <a:latin typeface="Calibri Light" panose="020F0302020204030204" pitchFamily="34" charset="0"/>
+                        </a:rPr>
+                        <a:t>64 kVA</a:t>
+                      </a:r>
+                    </a:p>
+                  </a:txBody>
+                  <a:tcPr marL="0" marR="0" marT="0" marB="0" anchor="ctr">
+                    <a:lnL>
+                      <a:noFill/>
+                    </a:lnL>
+                    <a:lnR>
+                      <a:noFill/>
+                    </a:lnR>
+                    <a:lnT>
+                      <a:noFill/>
+                    </a:lnT>
+                    <a:lnB>
+                      <a:noFill/>
+                    </a:lnB>
+                  </a:tcPr>
+                </a:tc>
+                <a:tc>
+                  <a:txBody>
+                    <a:bodyPr/>
+                    <a:lstStyle/>
+                    <a:p>
+                      <a:pPr algn="ctr" fontAlgn="ctr"/>
+                      <a:r>
+                        <a:rPr lang="fr-FR" sz="1300" b="0" i="0" u="none" strike="noStrike" dirty="0">
+                          <a:solidFill>
+                            <a:srgbClr val="222B35"/>
+                          </a:solidFill>
+                          <a:effectLst/>
+                          <a:latin typeface="Calibri Light" panose="020F0302020204030204" pitchFamily="34" charset="0"/>
+                        </a:rPr>
+                        <a:t>C4 4HS</a:t>
+                      </a:r>
+                    </a:p>
+                  </a:txBody>
+                  <a:tcPr marL="0" marR="0" marT="0" marB="0" anchor="ctr">
+                    <a:lnL>
+                      <a:noFill/>
+                    </a:lnL>
+                    <a:lnR>
+                      <a:noFill/>
+                    </a:lnR>
+                    <a:lnT>
+                      <a:noFill/>
+                    </a:lnT>
+                    <a:lnB>
+                      <a:noFill/>
+                    </a:lnB>
+                  </a:tcPr>
+                </a:tc>
+                <a:extLst>
+                  <a:ext uri="{0D108BD9-81ED-4DB2-BD59-A6C34878D82A}">
+                    <a16:rowId xmlns:a16="http://schemas.microsoft.com/office/drawing/2014/main" val="1571321464"/>
+                  </a:ext>
+                </a:extLst>
+              </a:tr>
+            </a:tbl>
+          </a:graphicData>
+        </a:graphic>
+      </p:graphicFrame>
     </p:spTree>
     <p:extLst>
       <p:ext uri="{BB962C8B-B14F-4D97-AF65-F5344CB8AC3E}">

</xml_diff>

<commit_message>
export usage et occupations
</commit_message>
<xml_diff>
--- a/app/src/test/resources/powerpointvierge.pptx
+++ b/app/src/test/resources/powerpointvierge.pptx
@@ -5173,7 +5173,7 @@
       </p:sp>
       <p:sp>
         <p:nvSpPr>
-          <p:cNvPr id="3" name="ZoneTexte 2">
+          <p:cNvPr id="3" name="nomCalendrier">
             <a:extLst>
               <a:ext uri="{FF2B5EF4-FFF2-40B4-BE49-F238E27FC236}">
                 <a16:creationId xmlns:a16="http://schemas.microsoft.com/office/drawing/2014/main" id="{50115717-A099-60F0-627C-4C067A3B99F6}"/>
@@ -5185,8 +5185,8 @@
         </p:nvSpPr>
         <p:spPr>
           <a:xfrm>
-            <a:off x="6562511" y="3987193"/>
-            <a:ext cx="4427144" cy="338554"/>
+            <a:off x="6095999" y="1061595"/>
+            <a:ext cx="5810055" cy="338554"/>
           </a:xfrm>
           <a:prstGeom prst="rect">
             <a:avLst/>
@@ -5232,7 +5232,139 @@
                 <a:latin typeface="Arial"/>
                 <a:cs typeface="Times New Roman"/>
               </a:rPr>
-              <a:t>Ceci est un descriptif</a:t>
+              <a:t> </a:t>
+            </a:r>
+          </a:p>
+        </p:txBody>
+      </p:sp>
+      <p:sp>
+        <p:nvSpPr>
+          <p:cNvPr id="2" name="nomZones">
+            <a:extLst>
+              <a:ext uri="{FF2B5EF4-FFF2-40B4-BE49-F238E27FC236}">
+                <a16:creationId xmlns:a16="http://schemas.microsoft.com/office/drawing/2014/main" id="{8CE3BEAC-A0B6-DA5C-89C3-4C9C65FA548E}"/>
+              </a:ext>
+            </a:extLst>
+          </p:cNvPr>
+          <p:cNvSpPr txBox="1"/>
+          <p:nvPr/>
+        </p:nvSpPr>
+        <p:spPr>
+          <a:xfrm>
+            <a:off x="6095999" y="1622572"/>
+            <a:ext cx="5810055" cy="338554"/>
+          </a:xfrm>
+          <a:prstGeom prst="rect">
+            <a:avLst/>
+          </a:prstGeom>
+          <a:solidFill>
+            <a:schemeClr val="tx1"/>
+          </a:solidFill>
+        </p:spPr>
+        <p:txBody>
+          <a:bodyPr wrap="square" lIns="91440" tIns="45720" rIns="91440" bIns="45720" anchor="t">
+            <a:spAutoFit/>
+          </a:bodyPr>
+          <a:lstStyle/>
+          <a:p>
+            <a:pPr marL="0" marR="0" lvl="0" indent="0" algn="l" defTabSz="914400" rtl="0" eaLnBrk="1" fontAlgn="auto" latinLnBrk="0" hangingPunct="1">
+              <a:lnSpc>
+                <a:spcPct val="100000"/>
+              </a:lnSpc>
+              <a:spcBef>
+                <a:spcPts val="0"/>
+              </a:spcBef>
+              <a:spcAft>
+                <a:spcPts val="0"/>
+              </a:spcAft>
+              <a:buClrTx/>
+              <a:buSzTx/>
+              <a:buFontTx/>
+              <a:buNone/>
+              <a:tabLst/>
+              <a:defRPr/>
+            </a:pPr>
+            <a:r>
+              <a:rPr kumimoji="0" lang="fr-FR" sz="1600" b="0" i="0" u="none" strike="noStrike" kern="1200" cap="none" spc="0" normalizeH="0" baseline="0" noProof="0" dirty="0">
+                <a:ln>
+                  <a:noFill/>
+                </a:ln>
+                <a:solidFill>
+                  <a:srgbClr val="FFFFFF"/>
+                </a:solidFill>
+                <a:effectLst/>
+                <a:uLnTx/>
+                <a:uFillTx/>
+                <a:latin typeface="Arial"/>
+                <a:cs typeface="Times New Roman"/>
+              </a:rPr>
+              <a:t> </a:t>
+            </a:r>
+          </a:p>
+        </p:txBody>
+      </p:sp>
+      <p:sp>
+        <p:nvSpPr>
+          <p:cNvPr id="4" name="remarqueRemarques occupation et régulation">
+            <a:extLst>
+              <a:ext uri="{FF2B5EF4-FFF2-40B4-BE49-F238E27FC236}">
+                <a16:creationId xmlns:a16="http://schemas.microsoft.com/office/drawing/2014/main" id="{AFE47CA8-9D7A-9E0A-1A57-4E5B535D7599}"/>
+              </a:ext>
+            </a:extLst>
+          </p:cNvPr>
+          <p:cNvSpPr txBox="1"/>
+          <p:nvPr/>
+        </p:nvSpPr>
+        <p:spPr>
+          <a:xfrm>
+            <a:off x="6095998" y="2209549"/>
+            <a:ext cx="5810055" cy="338554"/>
+          </a:xfrm>
+          <a:prstGeom prst="rect">
+            <a:avLst/>
+          </a:prstGeom>
+          <a:solidFill>
+            <a:schemeClr val="tx1"/>
+          </a:solidFill>
+        </p:spPr>
+        <p:txBody>
+          <a:bodyPr wrap="square" lIns="91440" tIns="45720" rIns="91440" bIns="45720" anchor="t">
+            <a:spAutoFit/>
+          </a:bodyPr>
+          <a:lstStyle/>
+          <a:p>
+            <a:pPr marL="0" marR="0" lvl="0" indent="0" algn="l" defTabSz="914400" rtl="0" eaLnBrk="1" fontAlgn="auto" latinLnBrk="0" hangingPunct="1">
+              <a:lnSpc>
+                <a:spcPct val="100000"/>
+              </a:lnSpc>
+              <a:spcBef>
+                <a:spcPts val="0"/>
+              </a:spcBef>
+              <a:spcAft>
+                <a:spcPts val="0"/>
+              </a:spcAft>
+              <a:buClrTx/>
+              <a:buSzTx/>
+              <a:buFontTx/>
+              <a:buNone/>
+              <a:tabLst/>
+              <a:defRPr/>
+            </a:pPr>
+            <a:r>
+              <a:rPr kumimoji="0" lang="fr-FR" sz="1600" b="0" i="0" u="none" strike="noStrike" kern="1200" cap="none" spc="0" normalizeH="0" baseline="0" noProof="0" dirty="0">
+                <a:ln>
+                  <a:noFill/>
+                </a:ln>
+                <a:solidFill>
+                  <a:srgbClr val="FFFFFF"/>
+                </a:solidFill>
+                <a:effectLst/>
+                <a:uLnTx/>
+                <a:uFillTx/>
+                <a:latin typeface="Arial"/>
+                <a:cs typeface="Times New Roman"/>
+              </a:rPr>
+              <a:t> </a:t>
             </a:r>
           </a:p>
         </p:txBody>

</xml_diff>

<commit_message>
slide Descriptif Enveloppe thermique
</commit_message>
<xml_diff>
--- a/app/src/test/resources/powerpointvierge.pptx
+++ b/app/src/test/resources/powerpointvierge.pptx
@@ -210,7 +210,7 @@
           <a:p>
             <a:fld id="{8EF2C5CC-36BA-4C84-AC43-9F8430F4AE76}" type="datetimeFigureOut">
               <a:rPr lang="fr-FR" smtClean="0"/>
-              <a:t>21/06/2023</a:t>
+              <a:t>22/06/2023</a:t>
             </a:fld>
             <a:endParaRPr lang="fr-FR"/>
           </a:p>
@@ -5955,6 +5955,1914 @@
           </a:p>
         </p:txBody>
       </p:sp>
+      <p:graphicFrame>
+        <p:nvGraphicFramePr>
+          <p:cNvPr id="5" name="tableauMur">
+            <a:extLst>
+              <a:ext uri="{FF2B5EF4-FFF2-40B4-BE49-F238E27FC236}">
+                <a16:creationId xmlns:a16="http://schemas.microsoft.com/office/drawing/2014/main" id="{A1CC5C10-A9F0-DACF-010D-1F5667308958}"/>
+              </a:ext>
+            </a:extLst>
+          </p:cNvPr>
+          <p:cNvGraphicFramePr>
+            <a:graphicFrameLocks noGrp="1"/>
+          </p:cNvGraphicFramePr>
+          <p:nvPr>
+            <p:extLst>
+              <p:ext uri="{D42A27DB-BD31-4B8C-83A1-F6EECF244321}">
+                <p14:modId xmlns:p14="http://schemas.microsoft.com/office/powerpoint/2010/main" val="2433303040"/>
+              </p:ext>
+            </p:extLst>
+          </p:nvPr>
+        </p:nvGraphicFramePr>
+        <p:xfrm>
+          <a:off x="240860" y="1023772"/>
+          <a:ext cx="5855139" cy="542138"/>
+        </p:xfrm>
+        <a:graphic>
+          <a:graphicData uri="http://schemas.openxmlformats.org/drawingml/2006/table">
+            <a:tbl>
+              <a:tblPr/>
+              <a:tblGrid>
+                <a:gridCol w="1882989">
+                  <a:extLst>
+                    <a:ext uri="{9D8B030D-6E8A-4147-A177-3AD203B41FA5}">
+                      <a16:colId xmlns:a16="http://schemas.microsoft.com/office/drawing/2014/main" val="3287588389"/>
+                    </a:ext>
+                  </a:extLst>
+                </a:gridCol>
+                <a:gridCol w="355400">
+                  <a:extLst>
+                    <a:ext uri="{9D8B030D-6E8A-4147-A177-3AD203B41FA5}">
+                      <a16:colId xmlns:a16="http://schemas.microsoft.com/office/drawing/2014/main" val="628254289"/>
+                    </a:ext>
+                  </a:extLst>
+                </a:gridCol>
+                <a:gridCol w="959276">
+                  <a:extLst>
+                    <a:ext uri="{9D8B030D-6E8A-4147-A177-3AD203B41FA5}">
+                      <a16:colId xmlns:a16="http://schemas.microsoft.com/office/drawing/2014/main" val="3751113852"/>
+                    </a:ext>
+                  </a:extLst>
+                </a:gridCol>
+                <a:gridCol w="1195527">
+                  <a:extLst>
+                    <a:ext uri="{9D8B030D-6E8A-4147-A177-3AD203B41FA5}">
+                      <a16:colId xmlns:a16="http://schemas.microsoft.com/office/drawing/2014/main" val="163742809"/>
+                    </a:ext>
+                  </a:extLst>
+                </a:gridCol>
+                <a:gridCol w="1461947">
+                  <a:extLst>
+                    <a:ext uri="{9D8B030D-6E8A-4147-A177-3AD203B41FA5}">
+                      <a16:colId xmlns:a16="http://schemas.microsoft.com/office/drawing/2014/main" val="3535382955"/>
+                    </a:ext>
+                  </a:extLst>
+                </a:gridCol>
+              </a:tblGrid>
+              <a:tr h="182880">
+                <a:tc gridSpan="5">
+                  <a:txBody>
+                    <a:bodyPr/>
+                    <a:lstStyle/>
+                    <a:p>
+                      <a:pPr algn="ctr" fontAlgn="ctr"/>
+                      <a:r>
+                        <a:rPr lang="fr-FR" sz="1100" b="1" i="0" u="none" strike="noStrike" dirty="0">
+                          <a:solidFill>
+                            <a:srgbClr val="FFFFFF"/>
+                          </a:solidFill>
+                          <a:effectLst/>
+                          <a:latin typeface="Calibri Light" panose="020F0302020204030204" pitchFamily="34" charset="0"/>
+                        </a:rPr>
+                        <a:t>MURS</a:t>
+                      </a:r>
+                    </a:p>
+                  </a:txBody>
+                  <a:tcPr marL="0" marR="0" marT="0" marB="0" anchor="ctr">
+                    <a:lnL>
+                      <a:noFill/>
+                    </a:lnL>
+                    <a:lnR>
+                      <a:noFill/>
+                    </a:lnR>
+                    <a:lnT>
+                      <a:noFill/>
+                    </a:lnT>
+                    <a:lnB>
+                      <a:noFill/>
+                    </a:lnB>
+                    <a:solidFill>
+                      <a:srgbClr val="1F4E78"/>
+                    </a:solidFill>
+                  </a:tcPr>
+                </a:tc>
+                <a:tc hMerge="1">
+                  <a:txBody>
+                    <a:bodyPr/>
+                    <a:lstStyle/>
+                    <a:p>
+                      <a:endParaRPr lang="fr-FR"/>
+                    </a:p>
+                  </a:txBody>
+                  <a:tcPr/>
+                </a:tc>
+                <a:tc hMerge="1">
+                  <a:txBody>
+                    <a:bodyPr/>
+                    <a:lstStyle/>
+                    <a:p>
+                      <a:endParaRPr lang="fr-FR"/>
+                    </a:p>
+                  </a:txBody>
+                  <a:tcPr/>
+                </a:tc>
+                <a:tc hMerge="1">
+                  <a:txBody>
+                    <a:bodyPr/>
+                    <a:lstStyle/>
+                    <a:p>
+                      <a:endParaRPr lang="fr-FR"/>
+                    </a:p>
+                  </a:txBody>
+                  <a:tcPr/>
+                </a:tc>
+                <a:tc hMerge="1">
+                  <a:txBody>
+                    <a:bodyPr/>
+                    <a:lstStyle/>
+                    <a:p>
+                      <a:endParaRPr lang="fr-FR"/>
+                    </a:p>
+                  </a:txBody>
+                  <a:tcPr/>
+                </a:tc>
+                <a:extLst>
+                  <a:ext uri="{0D108BD9-81ED-4DB2-BD59-A6C34878D82A}">
+                    <a16:rowId xmlns:a16="http://schemas.microsoft.com/office/drawing/2014/main" val="1380426276"/>
+                  </a:ext>
+                </a:extLst>
+              </a:tr>
+              <a:tr h="176378">
+                <a:tc>
+                  <a:txBody>
+                    <a:bodyPr/>
+                    <a:lstStyle/>
+                    <a:p>
+                      <a:pPr algn="l" fontAlgn="b"/>
+                      <a:endParaRPr lang="fr-FR" sz="1100" b="0" i="0" u="none" strike="noStrike" dirty="0">
+                        <a:solidFill>
+                          <a:srgbClr val="000000"/>
+                        </a:solidFill>
+                        <a:effectLst/>
+                        <a:latin typeface="Calibri Light" panose="020F0302020204030204" pitchFamily="34" charset="0"/>
+                      </a:endParaRPr>
+                    </a:p>
+                  </a:txBody>
+                  <a:tcPr marL="0" marR="0" marT="0" marB="0" anchor="b">
+                    <a:lnL>
+                      <a:noFill/>
+                    </a:lnL>
+                    <a:lnR>
+                      <a:noFill/>
+                    </a:lnR>
+                    <a:lnT>
+                      <a:noFill/>
+                    </a:lnT>
+                    <a:lnB>
+                      <a:noFill/>
+                    </a:lnB>
+                  </a:tcPr>
+                </a:tc>
+                <a:tc>
+                  <a:txBody>
+                    <a:bodyPr/>
+                    <a:lstStyle/>
+                    <a:p>
+                      <a:pPr algn="l" fontAlgn="b"/>
+                      <a:endParaRPr lang="fr-FR" sz="1100" b="0" i="0" u="none" strike="noStrike" dirty="0">
+                        <a:solidFill>
+                          <a:srgbClr val="000000"/>
+                        </a:solidFill>
+                        <a:effectLst/>
+                        <a:latin typeface="Calibri Light" panose="020F0302020204030204" pitchFamily="34" charset="0"/>
+                      </a:endParaRPr>
+                    </a:p>
+                  </a:txBody>
+                  <a:tcPr marL="0" marR="0" marT="0" marB="0" anchor="b">
+                    <a:lnL>
+                      <a:noFill/>
+                    </a:lnL>
+                    <a:lnR>
+                      <a:noFill/>
+                    </a:lnR>
+                    <a:lnT>
+                      <a:noFill/>
+                    </a:lnT>
+                    <a:lnB>
+                      <a:noFill/>
+                    </a:lnB>
+                  </a:tcPr>
+                </a:tc>
+                <a:tc>
+                  <a:txBody>
+                    <a:bodyPr/>
+                    <a:lstStyle/>
+                    <a:p>
+                      <a:pPr algn="l" fontAlgn="b"/>
+                      <a:endParaRPr lang="fr-FR" sz="1100" b="0" i="0" u="none" strike="noStrike" dirty="0">
+                        <a:solidFill>
+                          <a:srgbClr val="000000"/>
+                        </a:solidFill>
+                        <a:effectLst/>
+                        <a:latin typeface="Calibri Light" panose="020F0302020204030204" pitchFamily="34" charset="0"/>
+                      </a:endParaRPr>
+                    </a:p>
+                  </a:txBody>
+                  <a:tcPr marL="0" marR="0" marT="0" marB="0" anchor="b">
+                    <a:lnL>
+                      <a:noFill/>
+                    </a:lnL>
+                    <a:lnR>
+                      <a:noFill/>
+                    </a:lnR>
+                    <a:lnT>
+                      <a:noFill/>
+                    </a:lnT>
+                    <a:lnB>
+                      <a:noFill/>
+                    </a:lnB>
+                  </a:tcPr>
+                </a:tc>
+                <a:tc>
+                  <a:txBody>
+                    <a:bodyPr/>
+                    <a:lstStyle/>
+                    <a:p>
+                      <a:pPr algn="ctr" fontAlgn="b"/>
+                      <a:endParaRPr lang="fr-FR" sz="1100" b="0" i="0" u="none" strike="noStrike" dirty="0">
+                        <a:solidFill>
+                          <a:srgbClr val="000000"/>
+                        </a:solidFill>
+                        <a:effectLst/>
+                        <a:latin typeface="Calibri Light" panose="020F0302020204030204" pitchFamily="34" charset="0"/>
+                      </a:endParaRPr>
+                    </a:p>
+                  </a:txBody>
+                  <a:tcPr marL="0" marR="0" marT="0" marB="0" anchor="b">
+                    <a:lnL>
+                      <a:noFill/>
+                    </a:lnL>
+                    <a:lnR>
+                      <a:noFill/>
+                    </a:lnR>
+                    <a:lnT>
+                      <a:noFill/>
+                    </a:lnT>
+                    <a:lnB>
+                      <a:noFill/>
+                    </a:lnB>
+                  </a:tcPr>
+                </a:tc>
+                <a:tc>
+                  <a:txBody>
+                    <a:bodyPr/>
+                    <a:lstStyle/>
+                    <a:p>
+                      <a:pPr algn="l" fontAlgn="b"/>
+                      <a:endParaRPr lang="fr-FR" sz="1100" b="0" i="0" u="none" strike="noStrike" dirty="0">
+                        <a:solidFill>
+                          <a:srgbClr val="000000"/>
+                        </a:solidFill>
+                        <a:effectLst/>
+                        <a:latin typeface="Calibri Light" panose="020F0302020204030204" pitchFamily="34" charset="0"/>
+                      </a:endParaRPr>
+                    </a:p>
+                  </a:txBody>
+                  <a:tcPr marL="0" marR="0" marT="0" marB="0" anchor="b">
+                    <a:lnL>
+                      <a:noFill/>
+                    </a:lnL>
+                    <a:lnR>
+                      <a:noFill/>
+                    </a:lnR>
+                    <a:lnT>
+                      <a:noFill/>
+                    </a:lnT>
+                    <a:lnB>
+                      <a:noFill/>
+                    </a:lnB>
+                  </a:tcPr>
+                </a:tc>
+                <a:extLst>
+                  <a:ext uri="{0D108BD9-81ED-4DB2-BD59-A6C34878D82A}">
+                    <a16:rowId xmlns:a16="http://schemas.microsoft.com/office/drawing/2014/main" val="1013505100"/>
+                  </a:ext>
+                </a:extLst>
+              </a:tr>
+              <a:tr h="182880">
+                <a:tc>
+                  <a:txBody>
+                    <a:bodyPr/>
+                    <a:lstStyle/>
+                    <a:p>
+                      <a:pPr algn="ctr" fontAlgn="ctr"/>
+                      <a:r>
+                        <a:rPr lang="fr-FR" sz="1100" b="1" i="0" u="none" strike="noStrike" dirty="0">
+                          <a:solidFill>
+                            <a:srgbClr val="BF8F00"/>
+                          </a:solidFill>
+                          <a:effectLst/>
+                          <a:latin typeface="Calibri Light" panose="020F0302020204030204" pitchFamily="34" charset="0"/>
+                        </a:rPr>
+                        <a:t>CLASSES ET SALLES ANNEXES</a:t>
+                      </a:r>
+                    </a:p>
+                  </a:txBody>
+                  <a:tcPr marL="0" marR="0" marT="0" marB="0" anchor="ctr">
+                    <a:lnL>
+                      <a:noFill/>
+                    </a:lnL>
+                    <a:lnR>
+                      <a:noFill/>
+                    </a:lnR>
+                    <a:lnT>
+                      <a:noFill/>
+                    </a:lnT>
+                    <a:lnB>
+                      <a:noFill/>
+                    </a:lnB>
+                  </a:tcPr>
+                </a:tc>
+                <a:tc>
+                  <a:txBody>
+                    <a:bodyPr/>
+                    <a:lstStyle/>
+                    <a:p>
+                      <a:pPr algn="ctr" fontAlgn="ctr"/>
+                      <a:r>
+                        <a:rPr lang="fr-FR" sz="1100" b="0" i="0" u="none" strike="noStrike" dirty="0">
+                          <a:solidFill>
+                            <a:srgbClr val="000000"/>
+                          </a:solidFill>
+                          <a:effectLst/>
+                          <a:latin typeface="Calibri Light" panose="020F0302020204030204" pitchFamily="34" charset="0"/>
+                        </a:rPr>
+                        <a:t>Mur</a:t>
+                      </a:r>
+                    </a:p>
+                  </a:txBody>
+                  <a:tcPr marL="0" marR="0" marT="0" marB="0" anchor="ctr">
+                    <a:lnL>
+                      <a:noFill/>
+                    </a:lnL>
+                    <a:lnR>
+                      <a:noFill/>
+                    </a:lnR>
+                    <a:lnT>
+                      <a:noFill/>
+                    </a:lnT>
+                    <a:lnB>
+                      <a:noFill/>
+                    </a:lnB>
+                  </a:tcPr>
+                </a:tc>
+                <a:tc>
+                  <a:txBody>
+                    <a:bodyPr/>
+                    <a:lstStyle/>
+                    <a:p>
+                      <a:pPr algn="ctr" fontAlgn="ctr"/>
+                      <a:r>
+                        <a:rPr lang="fr-FR" sz="1100" b="0" i="0" u="none" strike="noStrike">
+                          <a:solidFill>
+                            <a:srgbClr val="000000"/>
+                          </a:solidFill>
+                          <a:effectLst/>
+                          <a:latin typeface="Calibri Light" panose="020F0302020204030204" pitchFamily="34" charset="0"/>
+                        </a:rPr>
+                        <a:t>Parpaing</a:t>
+                      </a:r>
+                    </a:p>
+                  </a:txBody>
+                  <a:tcPr marL="0" marR="0" marT="0" marB="0" anchor="ctr">
+                    <a:lnL>
+                      <a:noFill/>
+                    </a:lnL>
+                    <a:lnR>
+                      <a:noFill/>
+                    </a:lnR>
+                    <a:lnT>
+                      <a:noFill/>
+                    </a:lnT>
+                    <a:lnB>
+                      <a:noFill/>
+                    </a:lnB>
+                  </a:tcPr>
+                </a:tc>
+                <a:tc>
+                  <a:txBody>
+                    <a:bodyPr/>
+                    <a:lstStyle/>
+                    <a:p>
+                      <a:pPr algn="ctr" fontAlgn="b"/>
+                      <a:r>
+                        <a:rPr lang="fr-FR" sz="1100" b="0" i="0" u="none" strike="noStrike" dirty="0">
+                          <a:solidFill>
+                            <a:srgbClr val="000000"/>
+                          </a:solidFill>
+                          <a:effectLst/>
+                          <a:latin typeface="Calibri Light" panose="020F0302020204030204" pitchFamily="34" charset="0"/>
+                        </a:rPr>
+                        <a:t>Faiblement isolé</a:t>
+                      </a:r>
+                    </a:p>
+                  </a:txBody>
+                  <a:tcPr marL="0" marR="0" marT="0" marB="0" anchor="b">
+                    <a:lnL>
+                      <a:noFill/>
+                    </a:lnL>
+                    <a:lnR>
+                      <a:noFill/>
+                    </a:lnR>
+                    <a:lnT>
+                      <a:noFill/>
+                    </a:lnT>
+                    <a:lnB>
+                      <a:noFill/>
+                    </a:lnB>
+                  </a:tcPr>
+                </a:tc>
+                <a:tc>
+                  <a:txBody>
+                    <a:bodyPr/>
+                    <a:lstStyle/>
+                    <a:p>
+                      <a:pPr algn="ctr" fontAlgn="ctr"/>
+                      <a:r>
+                        <a:rPr lang="fr-FR" sz="1100" b="0" i="0" u="none" strike="noStrike" dirty="0">
+                          <a:solidFill>
+                            <a:srgbClr val="000000"/>
+                          </a:solidFill>
+                          <a:effectLst/>
+                          <a:latin typeface="Calibri Light" panose="020F0302020204030204" pitchFamily="34" charset="0"/>
+                        </a:rPr>
+                        <a:t>(Polystyrène,5 cm)</a:t>
+                      </a:r>
+                    </a:p>
+                  </a:txBody>
+                  <a:tcPr marL="0" marR="0" marT="0" marB="0" anchor="ctr">
+                    <a:lnL>
+                      <a:noFill/>
+                    </a:lnL>
+                    <a:lnR>
+                      <a:noFill/>
+                    </a:lnR>
+                    <a:lnT>
+                      <a:noFill/>
+                    </a:lnT>
+                    <a:lnB>
+                      <a:noFill/>
+                    </a:lnB>
+                  </a:tcPr>
+                </a:tc>
+                <a:extLst>
+                  <a:ext uri="{0D108BD9-81ED-4DB2-BD59-A6C34878D82A}">
+                    <a16:rowId xmlns:a16="http://schemas.microsoft.com/office/drawing/2014/main" val="2755759046"/>
+                  </a:ext>
+                </a:extLst>
+              </a:tr>
+            </a:tbl>
+          </a:graphicData>
+        </a:graphic>
+      </p:graphicFrame>
+      <p:graphicFrame>
+        <p:nvGraphicFramePr>
+          <p:cNvPr id="6" name="tableauToiture">
+            <a:extLst>
+              <a:ext uri="{FF2B5EF4-FFF2-40B4-BE49-F238E27FC236}">
+                <a16:creationId xmlns:a16="http://schemas.microsoft.com/office/drawing/2014/main" id="{9E258C51-EB35-716C-7259-45F14D37F15C}"/>
+              </a:ext>
+            </a:extLst>
+          </p:cNvPr>
+          <p:cNvGraphicFramePr>
+            <a:graphicFrameLocks noGrp="1"/>
+          </p:cNvGraphicFramePr>
+          <p:nvPr>
+            <p:extLst>
+              <p:ext uri="{D42A27DB-BD31-4B8C-83A1-F6EECF244321}">
+                <p14:modId xmlns:p14="http://schemas.microsoft.com/office/powerpoint/2010/main" val="71210251"/>
+              </p:ext>
+            </p:extLst>
+          </p:nvPr>
+        </p:nvGraphicFramePr>
+        <p:xfrm>
+          <a:off x="240860" y="1681622"/>
+          <a:ext cx="5855139" cy="640080"/>
+        </p:xfrm>
+        <a:graphic>
+          <a:graphicData uri="http://schemas.openxmlformats.org/drawingml/2006/table">
+            <a:tbl>
+              <a:tblPr/>
+              <a:tblGrid>
+                <a:gridCol w="1373640">
+                  <a:extLst>
+                    <a:ext uri="{9D8B030D-6E8A-4147-A177-3AD203B41FA5}">
+                      <a16:colId xmlns:a16="http://schemas.microsoft.com/office/drawing/2014/main" val="2619375881"/>
+                    </a:ext>
+                  </a:extLst>
+                </a:gridCol>
+                <a:gridCol w="1432019">
+                  <a:extLst>
+                    <a:ext uri="{9D8B030D-6E8A-4147-A177-3AD203B41FA5}">
+                      <a16:colId xmlns:a16="http://schemas.microsoft.com/office/drawing/2014/main" val="783090913"/>
+                    </a:ext>
+                  </a:extLst>
+                </a:gridCol>
+                <a:gridCol w="1493833">
+                  <a:extLst>
+                    <a:ext uri="{9D8B030D-6E8A-4147-A177-3AD203B41FA5}">
+                      <a16:colId xmlns:a16="http://schemas.microsoft.com/office/drawing/2014/main" val="2949780271"/>
+                    </a:ext>
+                  </a:extLst>
+                </a:gridCol>
+                <a:gridCol w="1555647">
+                  <a:extLst>
+                    <a:ext uri="{9D8B030D-6E8A-4147-A177-3AD203B41FA5}">
+                      <a16:colId xmlns:a16="http://schemas.microsoft.com/office/drawing/2014/main" val="3115914078"/>
+                    </a:ext>
+                  </a:extLst>
+                </a:gridCol>
+              </a:tblGrid>
+              <a:tr h="182880">
+                <a:tc gridSpan="4">
+                  <a:txBody>
+                    <a:bodyPr/>
+                    <a:lstStyle/>
+                    <a:p>
+                      <a:pPr algn="ctr" fontAlgn="ctr"/>
+                      <a:r>
+                        <a:rPr lang="fr-FR" sz="1100" b="1" i="0" u="none" strike="noStrike" dirty="0">
+                          <a:solidFill>
+                            <a:srgbClr val="FFFFFF"/>
+                          </a:solidFill>
+                          <a:effectLst/>
+                          <a:latin typeface="Calibri Light" panose="020F0302020204030204" pitchFamily="34" charset="0"/>
+                        </a:rPr>
+                        <a:t>TOITURE ET FAUX PLAFOND</a:t>
+                      </a:r>
+                    </a:p>
+                  </a:txBody>
+                  <a:tcPr marL="0" marR="0" marT="0" marB="0" anchor="ctr">
+                    <a:lnL>
+                      <a:noFill/>
+                    </a:lnL>
+                    <a:lnR>
+                      <a:noFill/>
+                    </a:lnR>
+                    <a:lnT>
+                      <a:noFill/>
+                    </a:lnT>
+                    <a:lnB>
+                      <a:noFill/>
+                    </a:lnB>
+                    <a:solidFill>
+                      <a:srgbClr val="BF8F00"/>
+                    </a:solidFill>
+                  </a:tcPr>
+                </a:tc>
+                <a:tc hMerge="1">
+                  <a:txBody>
+                    <a:bodyPr/>
+                    <a:lstStyle/>
+                    <a:p>
+                      <a:endParaRPr lang="fr-FR"/>
+                    </a:p>
+                  </a:txBody>
+                  <a:tcPr/>
+                </a:tc>
+                <a:tc hMerge="1">
+                  <a:txBody>
+                    <a:bodyPr/>
+                    <a:lstStyle/>
+                    <a:p>
+                      <a:endParaRPr lang="fr-FR"/>
+                    </a:p>
+                  </a:txBody>
+                  <a:tcPr/>
+                </a:tc>
+                <a:tc hMerge="1">
+                  <a:txBody>
+                    <a:bodyPr/>
+                    <a:lstStyle/>
+                    <a:p>
+                      <a:endParaRPr lang="fr-FR"/>
+                    </a:p>
+                  </a:txBody>
+                  <a:tcPr/>
+                </a:tc>
+                <a:extLst>
+                  <a:ext uri="{0D108BD9-81ED-4DB2-BD59-A6C34878D82A}">
+                    <a16:rowId xmlns:a16="http://schemas.microsoft.com/office/drawing/2014/main" val="450955503"/>
+                  </a:ext>
+                </a:extLst>
+              </a:tr>
+              <a:tr h="121920">
+                <a:tc>
+                  <a:txBody>
+                    <a:bodyPr/>
+                    <a:lstStyle/>
+                    <a:p>
+                      <a:pPr algn="l" fontAlgn="b"/>
+                      <a:endParaRPr lang="fr-FR" sz="800" b="0" i="0" u="none" strike="noStrike">
+                        <a:solidFill>
+                          <a:srgbClr val="000000"/>
+                        </a:solidFill>
+                        <a:effectLst/>
+                        <a:latin typeface="Arial" panose="020B0604020202020204" pitchFamily="34" charset="0"/>
+                      </a:endParaRPr>
+                    </a:p>
+                  </a:txBody>
+                  <a:tcPr marL="0" marR="0" marT="0" marB="0" anchor="b">
+                    <a:lnL>
+                      <a:noFill/>
+                    </a:lnL>
+                    <a:lnR>
+                      <a:noFill/>
+                    </a:lnR>
+                    <a:lnT>
+                      <a:noFill/>
+                    </a:lnT>
+                    <a:lnB>
+                      <a:noFill/>
+                    </a:lnB>
+                  </a:tcPr>
+                </a:tc>
+                <a:tc>
+                  <a:txBody>
+                    <a:bodyPr/>
+                    <a:lstStyle/>
+                    <a:p>
+                      <a:pPr algn="l" fontAlgn="b"/>
+                      <a:endParaRPr lang="fr-FR" sz="800" b="0" i="0" u="none" strike="noStrike">
+                        <a:solidFill>
+                          <a:srgbClr val="000000"/>
+                        </a:solidFill>
+                        <a:effectLst/>
+                        <a:latin typeface="Arial" panose="020B0604020202020204" pitchFamily="34" charset="0"/>
+                      </a:endParaRPr>
+                    </a:p>
+                  </a:txBody>
+                  <a:tcPr marL="0" marR="0" marT="0" marB="0" anchor="b">
+                    <a:lnL>
+                      <a:noFill/>
+                    </a:lnL>
+                    <a:lnR>
+                      <a:noFill/>
+                    </a:lnR>
+                    <a:lnT>
+                      <a:noFill/>
+                    </a:lnT>
+                    <a:lnB>
+                      <a:noFill/>
+                    </a:lnB>
+                  </a:tcPr>
+                </a:tc>
+                <a:tc>
+                  <a:txBody>
+                    <a:bodyPr/>
+                    <a:lstStyle/>
+                    <a:p>
+                      <a:pPr algn="l" fontAlgn="b"/>
+                      <a:endParaRPr lang="fr-FR" sz="800" b="0" i="0" u="none" strike="noStrike">
+                        <a:solidFill>
+                          <a:srgbClr val="000000"/>
+                        </a:solidFill>
+                        <a:effectLst/>
+                        <a:latin typeface="Arial" panose="020B0604020202020204" pitchFamily="34" charset="0"/>
+                      </a:endParaRPr>
+                    </a:p>
+                  </a:txBody>
+                  <a:tcPr marL="0" marR="0" marT="0" marB="0" anchor="b">
+                    <a:lnL>
+                      <a:noFill/>
+                    </a:lnL>
+                    <a:lnR>
+                      <a:noFill/>
+                    </a:lnR>
+                    <a:lnT>
+                      <a:noFill/>
+                    </a:lnT>
+                    <a:lnB>
+                      <a:noFill/>
+                    </a:lnB>
+                  </a:tcPr>
+                </a:tc>
+                <a:tc>
+                  <a:txBody>
+                    <a:bodyPr/>
+                    <a:lstStyle/>
+                    <a:p>
+                      <a:pPr algn="l" fontAlgn="b"/>
+                      <a:endParaRPr lang="fr-FR" sz="800" b="0" i="0" u="none" strike="noStrike">
+                        <a:solidFill>
+                          <a:srgbClr val="000000"/>
+                        </a:solidFill>
+                        <a:effectLst/>
+                        <a:latin typeface="Arial" panose="020B0604020202020204" pitchFamily="34" charset="0"/>
+                      </a:endParaRPr>
+                    </a:p>
+                  </a:txBody>
+                  <a:tcPr marL="0" marR="0" marT="0" marB="0" anchor="b">
+                    <a:lnL>
+                      <a:noFill/>
+                    </a:lnL>
+                    <a:lnR>
+                      <a:noFill/>
+                    </a:lnR>
+                    <a:lnT>
+                      <a:noFill/>
+                    </a:lnT>
+                    <a:lnB>
+                      <a:noFill/>
+                    </a:lnB>
+                  </a:tcPr>
+                </a:tc>
+                <a:extLst>
+                  <a:ext uri="{0D108BD9-81ED-4DB2-BD59-A6C34878D82A}">
+                    <a16:rowId xmlns:a16="http://schemas.microsoft.com/office/drawing/2014/main" val="3213659516"/>
+                  </a:ext>
+                </a:extLst>
+              </a:tr>
+              <a:tr h="182880">
+                <a:tc>
+                  <a:txBody>
+                    <a:bodyPr/>
+                    <a:lstStyle/>
+                    <a:p>
+                      <a:pPr algn="ctr" fontAlgn="ctr"/>
+                      <a:r>
+                        <a:rPr lang="fr-FR" sz="1100" b="1" i="0" u="none" strike="noStrike" dirty="0">
+                          <a:solidFill>
+                            <a:srgbClr val="BF8F00"/>
+                          </a:solidFill>
+                          <a:effectLst/>
+                          <a:latin typeface="Calibri Light" panose="020F0302020204030204" pitchFamily="34" charset="0"/>
+                        </a:rPr>
+                        <a:t>CLASSES ET SALLES ANNEXES</a:t>
+                      </a:r>
+                    </a:p>
+                  </a:txBody>
+                  <a:tcPr marL="0" marR="0" marT="0" marB="0" anchor="ctr">
+                    <a:lnL>
+                      <a:noFill/>
+                    </a:lnL>
+                    <a:lnR>
+                      <a:noFill/>
+                    </a:lnR>
+                    <a:lnT>
+                      <a:noFill/>
+                    </a:lnT>
+                    <a:lnB>
+                      <a:noFill/>
+                    </a:lnB>
+                  </a:tcPr>
+                </a:tc>
+                <a:tc>
+                  <a:txBody>
+                    <a:bodyPr/>
+                    <a:lstStyle/>
+                    <a:p>
+                      <a:pPr algn="ctr" fontAlgn="ctr"/>
+                      <a:r>
+                        <a:rPr lang="fr-FR" sz="1100" b="0" i="0" u="none" strike="noStrike" dirty="0">
+                          <a:solidFill>
+                            <a:srgbClr val="000000"/>
+                          </a:solidFill>
+                          <a:effectLst/>
+                          <a:latin typeface="Calibri Light" panose="020F0302020204030204" pitchFamily="34" charset="0"/>
+                        </a:rPr>
+                        <a:t>Faux plafond en dalles</a:t>
+                      </a:r>
+                    </a:p>
+                  </a:txBody>
+                  <a:tcPr marL="0" marR="0" marT="0" marB="0" anchor="ctr">
+                    <a:lnL>
+                      <a:noFill/>
+                    </a:lnL>
+                    <a:lnR>
+                      <a:noFill/>
+                    </a:lnR>
+                    <a:lnT>
+                      <a:noFill/>
+                    </a:lnT>
+                    <a:lnB>
+                      <a:noFill/>
+                    </a:lnB>
+                  </a:tcPr>
+                </a:tc>
+                <a:tc>
+                  <a:txBody>
+                    <a:bodyPr/>
+                    <a:lstStyle/>
+                    <a:p>
+                      <a:pPr algn="ctr" fontAlgn="ctr"/>
+                      <a:r>
+                        <a:rPr lang="fr-FR" sz="1100" b="0" i="0" u="none" strike="noStrike" dirty="0">
+                          <a:solidFill>
+                            <a:srgbClr val="000000"/>
+                          </a:solidFill>
+                          <a:effectLst/>
+                          <a:latin typeface="Calibri Light" panose="020F0302020204030204" pitchFamily="34" charset="0"/>
+                        </a:rPr>
+                        <a:t>Moyennement isolé</a:t>
+                      </a:r>
+                    </a:p>
+                  </a:txBody>
+                  <a:tcPr marL="0" marR="0" marT="0" marB="0" anchor="ctr">
+                    <a:lnL>
+                      <a:noFill/>
+                    </a:lnL>
+                    <a:lnR>
+                      <a:noFill/>
+                    </a:lnR>
+                    <a:lnT>
+                      <a:noFill/>
+                    </a:lnT>
+                    <a:lnB>
+                      <a:noFill/>
+                    </a:lnB>
+                  </a:tcPr>
+                </a:tc>
+                <a:tc>
+                  <a:txBody>
+                    <a:bodyPr/>
+                    <a:lstStyle/>
+                    <a:p>
+                      <a:pPr algn="ctr" fontAlgn="b"/>
+                      <a:r>
+                        <a:rPr lang="fr-FR" sz="1100" b="0" i="0" u="none" strike="noStrike" dirty="0">
+                          <a:solidFill>
+                            <a:srgbClr val="000000"/>
+                          </a:solidFill>
+                          <a:effectLst/>
+                          <a:latin typeface="Calibri Light" panose="020F0302020204030204" pitchFamily="34" charset="0"/>
+                        </a:rPr>
+                        <a:t>(Laine </a:t>
+                      </a:r>
+                      <a:r>
+                        <a:rPr lang="fr-FR" sz="1100" b="0" i="0" u="none" strike="noStrike" dirty="0" err="1">
+                          <a:solidFill>
+                            <a:srgbClr val="000000"/>
+                          </a:solidFill>
+                          <a:effectLst/>
+                          <a:latin typeface="Calibri Light" panose="020F0302020204030204" pitchFamily="34" charset="0"/>
+                        </a:rPr>
+                        <a:t>minérale,env</a:t>
+                      </a:r>
+                      <a:r>
+                        <a:rPr lang="fr-FR" sz="1100" b="0" i="0" u="none" strike="noStrike" dirty="0">
+                          <a:solidFill>
+                            <a:srgbClr val="000000"/>
+                          </a:solidFill>
+                          <a:effectLst/>
+                          <a:latin typeface="Calibri Light" panose="020F0302020204030204" pitchFamily="34" charset="0"/>
+                        </a:rPr>
+                        <a:t> 20 cm </a:t>
+                      </a:r>
+                      <a:r>
+                        <a:rPr lang="fr-FR" sz="1100" b="0" i="0" u="none" strike="noStrike" dirty="0" err="1">
+                          <a:solidFill>
+                            <a:srgbClr val="000000"/>
+                          </a:solidFill>
+                          <a:effectLst/>
+                          <a:latin typeface="Calibri Light" panose="020F0302020204030204" pitchFamily="34" charset="0"/>
+                        </a:rPr>
+                        <a:t>cm</a:t>
+                      </a:r>
+                      <a:r>
+                        <a:rPr lang="fr-FR" sz="1100" b="0" i="0" u="none" strike="noStrike" dirty="0">
+                          <a:solidFill>
+                            <a:srgbClr val="000000"/>
+                          </a:solidFill>
+                          <a:effectLst/>
+                          <a:latin typeface="Calibri Light" panose="020F0302020204030204" pitchFamily="34" charset="0"/>
+                        </a:rPr>
+                        <a:t>)</a:t>
+                      </a:r>
+                    </a:p>
+                  </a:txBody>
+                  <a:tcPr marL="0" marR="0" marT="0" marB="0" anchor="ctr">
+                    <a:lnL>
+                      <a:noFill/>
+                    </a:lnL>
+                    <a:lnR>
+                      <a:noFill/>
+                    </a:lnR>
+                    <a:lnT>
+                      <a:noFill/>
+                    </a:lnT>
+                    <a:lnB>
+                      <a:noFill/>
+                    </a:lnB>
+                  </a:tcPr>
+                </a:tc>
+                <a:extLst>
+                  <a:ext uri="{0D108BD9-81ED-4DB2-BD59-A6C34878D82A}">
+                    <a16:rowId xmlns:a16="http://schemas.microsoft.com/office/drawing/2014/main" val="2180863277"/>
+                  </a:ext>
+                </a:extLst>
+              </a:tr>
+            </a:tbl>
+          </a:graphicData>
+        </a:graphic>
+      </p:graphicFrame>
+      <p:graphicFrame>
+        <p:nvGraphicFramePr>
+          <p:cNvPr id="7" name="tableauMenuiseries">
+            <a:extLst>
+              <a:ext uri="{FF2B5EF4-FFF2-40B4-BE49-F238E27FC236}">
+                <a16:creationId xmlns:a16="http://schemas.microsoft.com/office/drawing/2014/main" id="{9C567A73-CFCB-6419-3DDE-BA0398D2CDBE}"/>
+              </a:ext>
+            </a:extLst>
+          </p:cNvPr>
+          <p:cNvGraphicFramePr>
+            <a:graphicFrameLocks noGrp="1"/>
+          </p:cNvGraphicFramePr>
+          <p:nvPr>
+            <p:extLst>
+              <p:ext uri="{D42A27DB-BD31-4B8C-83A1-F6EECF244321}">
+                <p14:modId xmlns:p14="http://schemas.microsoft.com/office/powerpoint/2010/main" val="849732058"/>
+              </p:ext>
+            </p:extLst>
+          </p:nvPr>
+        </p:nvGraphicFramePr>
+        <p:xfrm>
+          <a:off x="240861" y="2593249"/>
+          <a:ext cx="5855138" cy="608949"/>
+        </p:xfrm>
+        <a:graphic>
+          <a:graphicData uri="http://schemas.openxmlformats.org/drawingml/2006/table">
+            <a:tbl>
+              <a:tblPr/>
+              <a:tblGrid>
+                <a:gridCol w="1127770">
+                  <a:extLst>
+                    <a:ext uri="{9D8B030D-6E8A-4147-A177-3AD203B41FA5}">
+                      <a16:colId xmlns:a16="http://schemas.microsoft.com/office/drawing/2014/main" val="1591265950"/>
+                    </a:ext>
+                  </a:extLst>
+                </a:gridCol>
+                <a:gridCol w="760086">
+                  <a:extLst>
+                    <a:ext uri="{9D8B030D-6E8A-4147-A177-3AD203B41FA5}">
+                      <a16:colId xmlns:a16="http://schemas.microsoft.com/office/drawing/2014/main" val="2936319664"/>
+                    </a:ext>
+                  </a:extLst>
+                </a:gridCol>
+                <a:gridCol w="667394">
+                  <a:extLst>
+                    <a:ext uri="{9D8B030D-6E8A-4147-A177-3AD203B41FA5}">
+                      <a16:colId xmlns:a16="http://schemas.microsoft.com/office/drawing/2014/main" val="2739869232"/>
+                    </a:ext>
+                  </a:extLst>
+                </a:gridCol>
+                <a:gridCol w="983409">
+                  <a:extLst>
+                    <a:ext uri="{9D8B030D-6E8A-4147-A177-3AD203B41FA5}">
+                      <a16:colId xmlns:a16="http://schemas.microsoft.com/office/drawing/2014/main" val="1367575770"/>
+                    </a:ext>
+                  </a:extLst>
+                </a:gridCol>
+                <a:gridCol w="368274">
+                  <a:extLst>
+                    <a:ext uri="{9D8B030D-6E8A-4147-A177-3AD203B41FA5}">
+                      <a16:colId xmlns:a16="http://schemas.microsoft.com/office/drawing/2014/main" val="3215154033"/>
+                    </a:ext>
+                  </a:extLst>
+                </a:gridCol>
+                <a:gridCol w="1948205">
+                  <a:extLst>
+                    <a:ext uri="{9D8B030D-6E8A-4147-A177-3AD203B41FA5}">
+                      <a16:colId xmlns:a16="http://schemas.microsoft.com/office/drawing/2014/main" val="3144723141"/>
+                    </a:ext>
+                  </a:extLst>
+                </a:gridCol>
+              </a:tblGrid>
+              <a:tr h="164201">
+                <a:tc gridSpan="6">
+                  <a:txBody>
+                    <a:bodyPr/>
+                    <a:lstStyle/>
+                    <a:p>
+                      <a:pPr algn="ctr" fontAlgn="ctr"/>
+                      <a:r>
+                        <a:rPr lang="fr-FR" sz="900" b="1" i="0" u="none" strike="noStrike" dirty="0">
+                          <a:solidFill>
+                            <a:srgbClr val="FFFFFF"/>
+                          </a:solidFill>
+                          <a:effectLst/>
+                          <a:latin typeface="Calibri Light" panose="020F0302020204030204" pitchFamily="34" charset="0"/>
+                        </a:rPr>
+                        <a:t>MENUISERIES</a:t>
+                      </a:r>
+                    </a:p>
+                  </a:txBody>
+                  <a:tcPr marL="0" marR="0" marT="0" marB="0" anchor="ctr">
+                    <a:lnL>
+                      <a:noFill/>
+                    </a:lnL>
+                    <a:lnR>
+                      <a:noFill/>
+                    </a:lnR>
+                    <a:lnT>
+                      <a:noFill/>
+                    </a:lnT>
+                    <a:lnB>
+                      <a:noFill/>
+                    </a:lnB>
+                    <a:solidFill>
+                      <a:srgbClr val="70AD47"/>
+                    </a:solidFill>
+                  </a:tcPr>
+                </a:tc>
+                <a:tc hMerge="1">
+                  <a:txBody>
+                    <a:bodyPr/>
+                    <a:lstStyle/>
+                    <a:p>
+                      <a:endParaRPr lang="fr-FR"/>
+                    </a:p>
+                  </a:txBody>
+                  <a:tcPr/>
+                </a:tc>
+                <a:tc hMerge="1">
+                  <a:txBody>
+                    <a:bodyPr/>
+                    <a:lstStyle/>
+                    <a:p>
+                      <a:endParaRPr lang="fr-FR"/>
+                    </a:p>
+                  </a:txBody>
+                  <a:tcPr/>
+                </a:tc>
+                <a:tc hMerge="1">
+                  <a:txBody>
+                    <a:bodyPr/>
+                    <a:lstStyle/>
+                    <a:p>
+                      <a:endParaRPr lang="fr-FR"/>
+                    </a:p>
+                  </a:txBody>
+                  <a:tcPr/>
+                </a:tc>
+                <a:tc hMerge="1">
+                  <a:txBody>
+                    <a:bodyPr/>
+                    <a:lstStyle/>
+                    <a:p>
+                      <a:endParaRPr lang="fr-FR"/>
+                    </a:p>
+                  </a:txBody>
+                  <a:tcPr/>
+                </a:tc>
+                <a:tc hMerge="1">
+                  <a:txBody>
+                    <a:bodyPr/>
+                    <a:lstStyle/>
+                    <a:p>
+                      <a:endParaRPr lang="fr-FR"/>
+                    </a:p>
+                  </a:txBody>
+                  <a:tcPr/>
+                </a:tc>
+                <a:extLst>
+                  <a:ext uri="{0D108BD9-81ED-4DB2-BD59-A6C34878D82A}">
+                    <a16:rowId xmlns:a16="http://schemas.microsoft.com/office/drawing/2014/main" val="886054855"/>
+                  </a:ext>
+                </a:extLst>
+              </a:tr>
+              <a:tr h="109468">
+                <a:tc>
+                  <a:txBody>
+                    <a:bodyPr/>
+                    <a:lstStyle/>
+                    <a:p>
+                      <a:pPr algn="l" fontAlgn="b"/>
+                      <a:endParaRPr lang="fr-FR" sz="500" b="0" i="0" u="none" strike="noStrike">
+                        <a:solidFill>
+                          <a:srgbClr val="000000"/>
+                        </a:solidFill>
+                        <a:effectLst/>
+                        <a:latin typeface="Arial" panose="020B0604020202020204" pitchFamily="34" charset="0"/>
+                      </a:endParaRPr>
+                    </a:p>
+                  </a:txBody>
+                  <a:tcPr marL="0" marR="0" marT="0" marB="0" anchor="b">
+                    <a:lnL>
+                      <a:noFill/>
+                    </a:lnL>
+                    <a:lnR>
+                      <a:noFill/>
+                    </a:lnR>
+                    <a:lnT>
+                      <a:noFill/>
+                    </a:lnT>
+                    <a:lnB>
+                      <a:noFill/>
+                    </a:lnB>
+                  </a:tcPr>
+                </a:tc>
+                <a:tc>
+                  <a:txBody>
+                    <a:bodyPr/>
+                    <a:lstStyle/>
+                    <a:p>
+                      <a:pPr algn="l" fontAlgn="b"/>
+                      <a:endParaRPr lang="fr-FR" sz="500" b="0" i="0" u="none" strike="noStrike">
+                        <a:solidFill>
+                          <a:srgbClr val="000000"/>
+                        </a:solidFill>
+                        <a:effectLst/>
+                        <a:latin typeface="Arial" panose="020B0604020202020204" pitchFamily="34" charset="0"/>
+                      </a:endParaRPr>
+                    </a:p>
+                  </a:txBody>
+                  <a:tcPr marL="0" marR="0" marT="0" marB="0" anchor="b">
+                    <a:lnL>
+                      <a:noFill/>
+                    </a:lnL>
+                    <a:lnR>
+                      <a:noFill/>
+                    </a:lnR>
+                    <a:lnT>
+                      <a:noFill/>
+                    </a:lnT>
+                    <a:lnB>
+                      <a:noFill/>
+                    </a:lnB>
+                  </a:tcPr>
+                </a:tc>
+                <a:tc>
+                  <a:txBody>
+                    <a:bodyPr/>
+                    <a:lstStyle/>
+                    <a:p>
+                      <a:pPr algn="l" fontAlgn="b"/>
+                      <a:endParaRPr lang="fr-FR" sz="500" b="0" i="0" u="none" strike="noStrike">
+                        <a:solidFill>
+                          <a:srgbClr val="000000"/>
+                        </a:solidFill>
+                        <a:effectLst/>
+                        <a:latin typeface="Arial" panose="020B0604020202020204" pitchFamily="34" charset="0"/>
+                      </a:endParaRPr>
+                    </a:p>
+                  </a:txBody>
+                  <a:tcPr marL="0" marR="0" marT="0" marB="0" anchor="b">
+                    <a:lnL>
+                      <a:noFill/>
+                    </a:lnL>
+                    <a:lnR>
+                      <a:noFill/>
+                    </a:lnR>
+                    <a:lnT>
+                      <a:noFill/>
+                    </a:lnT>
+                    <a:lnB>
+                      <a:noFill/>
+                    </a:lnB>
+                  </a:tcPr>
+                </a:tc>
+                <a:tc>
+                  <a:txBody>
+                    <a:bodyPr/>
+                    <a:lstStyle/>
+                    <a:p>
+                      <a:pPr algn="l" fontAlgn="b"/>
+                      <a:endParaRPr lang="fr-FR" sz="500" b="0" i="0" u="none" strike="noStrike">
+                        <a:solidFill>
+                          <a:srgbClr val="000000"/>
+                        </a:solidFill>
+                        <a:effectLst/>
+                        <a:latin typeface="Arial" panose="020B0604020202020204" pitchFamily="34" charset="0"/>
+                      </a:endParaRPr>
+                    </a:p>
+                  </a:txBody>
+                  <a:tcPr marL="0" marR="0" marT="0" marB="0" anchor="b">
+                    <a:lnL>
+                      <a:noFill/>
+                    </a:lnL>
+                    <a:lnR>
+                      <a:noFill/>
+                    </a:lnR>
+                    <a:lnT>
+                      <a:noFill/>
+                    </a:lnT>
+                    <a:lnB>
+                      <a:noFill/>
+                    </a:lnB>
+                  </a:tcPr>
+                </a:tc>
+                <a:tc>
+                  <a:txBody>
+                    <a:bodyPr/>
+                    <a:lstStyle/>
+                    <a:p>
+                      <a:pPr algn="l" fontAlgn="b"/>
+                      <a:endParaRPr lang="fr-FR" sz="500" b="0" i="0" u="none" strike="noStrike">
+                        <a:solidFill>
+                          <a:srgbClr val="000000"/>
+                        </a:solidFill>
+                        <a:effectLst/>
+                        <a:latin typeface="Arial" panose="020B0604020202020204" pitchFamily="34" charset="0"/>
+                      </a:endParaRPr>
+                    </a:p>
+                  </a:txBody>
+                  <a:tcPr marL="0" marR="0" marT="0" marB="0" anchor="b">
+                    <a:lnL>
+                      <a:noFill/>
+                    </a:lnL>
+                    <a:lnR>
+                      <a:noFill/>
+                    </a:lnR>
+                    <a:lnT>
+                      <a:noFill/>
+                    </a:lnT>
+                    <a:lnB>
+                      <a:noFill/>
+                    </a:lnB>
+                  </a:tcPr>
+                </a:tc>
+                <a:tc>
+                  <a:txBody>
+                    <a:bodyPr/>
+                    <a:lstStyle/>
+                    <a:p>
+                      <a:pPr algn="l" fontAlgn="b"/>
+                      <a:endParaRPr lang="fr-FR" sz="500" b="0" i="0" u="none" strike="noStrike">
+                        <a:solidFill>
+                          <a:srgbClr val="000000"/>
+                        </a:solidFill>
+                        <a:effectLst/>
+                        <a:latin typeface="Arial" panose="020B0604020202020204" pitchFamily="34" charset="0"/>
+                      </a:endParaRPr>
+                    </a:p>
+                  </a:txBody>
+                  <a:tcPr marL="0" marR="0" marT="0" marB="0" anchor="b">
+                    <a:lnL>
+                      <a:noFill/>
+                    </a:lnL>
+                    <a:lnR>
+                      <a:noFill/>
+                    </a:lnR>
+                    <a:lnT>
+                      <a:noFill/>
+                    </a:lnT>
+                    <a:lnB>
+                      <a:noFill/>
+                    </a:lnB>
+                  </a:tcPr>
+                </a:tc>
+                <a:extLst>
+                  <a:ext uri="{0D108BD9-81ED-4DB2-BD59-A6C34878D82A}">
+                    <a16:rowId xmlns:a16="http://schemas.microsoft.com/office/drawing/2014/main" val="407175041"/>
+                  </a:ext>
+                </a:extLst>
+              </a:tr>
+              <a:tr h="301036">
+                <a:tc>
+                  <a:txBody>
+                    <a:bodyPr/>
+                    <a:lstStyle/>
+                    <a:p>
+                      <a:pPr algn="ctr" fontAlgn="ctr"/>
+                      <a:r>
+                        <a:rPr lang="fr-FR" sz="1100" b="1" i="0" u="none" strike="noStrike" dirty="0">
+                          <a:solidFill>
+                            <a:srgbClr val="1F4E78"/>
+                          </a:solidFill>
+                          <a:effectLst/>
+                          <a:latin typeface="Calibri Light" panose="020F0302020204030204" pitchFamily="34" charset="0"/>
+                        </a:rPr>
+                        <a:t>COULOIR</a:t>
+                      </a:r>
+                    </a:p>
+                  </a:txBody>
+                  <a:tcPr marL="0" marR="0" marT="0" marB="0" anchor="ctr">
+                    <a:lnL>
+                      <a:noFill/>
+                    </a:lnL>
+                    <a:lnR>
+                      <a:noFill/>
+                    </a:lnR>
+                    <a:lnT>
+                      <a:noFill/>
+                    </a:lnT>
+                    <a:lnB>
+                      <a:noFill/>
+                    </a:lnB>
+                  </a:tcPr>
+                </a:tc>
+                <a:tc>
+                  <a:txBody>
+                    <a:bodyPr/>
+                    <a:lstStyle/>
+                    <a:p>
+                      <a:pPr algn="ctr" fontAlgn="ctr"/>
+                      <a:r>
+                        <a:rPr lang="fr-FR" sz="1100" b="0" i="0" u="none" strike="noStrike" dirty="0">
+                          <a:solidFill>
+                            <a:srgbClr val="000000"/>
+                          </a:solidFill>
+                          <a:effectLst/>
+                          <a:latin typeface="Calibri Light" panose="020F0302020204030204" pitchFamily="34" charset="0"/>
+                        </a:rPr>
+                        <a:t>Porte-fenêtre</a:t>
+                      </a:r>
+                    </a:p>
+                  </a:txBody>
+                  <a:tcPr marL="0" marR="0" marT="0" marB="0" anchor="ctr">
+                    <a:lnL>
+                      <a:noFill/>
+                    </a:lnL>
+                    <a:lnR>
+                      <a:noFill/>
+                    </a:lnR>
+                    <a:lnT>
+                      <a:noFill/>
+                    </a:lnT>
+                    <a:lnB>
+                      <a:noFill/>
+                    </a:lnB>
+                  </a:tcPr>
+                </a:tc>
+                <a:tc>
+                  <a:txBody>
+                    <a:bodyPr/>
+                    <a:lstStyle/>
+                    <a:p>
+                      <a:pPr algn="ctr" fontAlgn="ctr"/>
+                      <a:r>
+                        <a:rPr lang="fr-FR" sz="1100" b="0" i="0" u="none" strike="noStrike" dirty="0">
+                          <a:solidFill>
+                            <a:srgbClr val="000000"/>
+                          </a:solidFill>
+                          <a:effectLst/>
+                          <a:latin typeface="Calibri Light" panose="020F0302020204030204" pitchFamily="34" charset="0"/>
+                        </a:rPr>
+                        <a:t>Aluminium</a:t>
+                      </a:r>
+                    </a:p>
+                  </a:txBody>
+                  <a:tcPr marL="0" marR="0" marT="0" marB="0" anchor="ctr">
+                    <a:lnL>
+                      <a:noFill/>
+                    </a:lnL>
+                    <a:lnR>
+                      <a:noFill/>
+                    </a:lnR>
+                    <a:lnT>
+                      <a:noFill/>
+                    </a:lnT>
+                    <a:lnB>
+                      <a:noFill/>
+                    </a:lnB>
+                  </a:tcPr>
+                </a:tc>
+                <a:tc>
+                  <a:txBody>
+                    <a:bodyPr/>
+                    <a:lstStyle/>
+                    <a:p>
+                      <a:pPr algn="ctr" fontAlgn="ctr"/>
+                      <a:r>
+                        <a:rPr lang="fr-FR" sz="1100" b="0" i="0" u="none" strike="noStrike" dirty="0">
+                          <a:solidFill>
+                            <a:srgbClr val="000000"/>
+                          </a:solidFill>
+                          <a:effectLst/>
+                          <a:latin typeface="Calibri Light" panose="020F0302020204030204" pitchFamily="34" charset="0"/>
+                        </a:rPr>
+                        <a:t>DV 4-12-4 ou </a:t>
+                      </a:r>
+                      <a:r>
+                        <a:rPr lang="fr-FR" sz="1100" b="0" i="0" u="none" strike="noStrike" dirty="0" err="1">
+                          <a:solidFill>
+                            <a:srgbClr val="000000"/>
+                          </a:solidFill>
+                          <a:effectLst/>
+                          <a:latin typeface="Calibri Light" panose="020F0302020204030204" pitchFamily="34" charset="0"/>
+                        </a:rPr>
+                        <a:t>éq</a:t>
+                      </a:r>
+                      <a:endParaRPr lang="fr-FR" sz="1100" b="0" i="0" u="none" strike="noStrike" dirty="0">
+                        <a:solidFill>
+                          <a:srgbClr val="000000"/>
+                        </a:solidFill>
+                        <a:effectLst/>
+                        <a:latin typeface="Calibri Light" panose="020F0302020204030204" pitchFamily="34" charset="0"/>
+                      </a:endParaRPr>
+                    </a:p>
+                  </a:txBody>
+                  <a:tcPr marL="0" marR="0" marT="0" marB="0" anchor="ctr">
+                    <a:lnL>
+                      <a:noFill/>
+                    </a:lnL>
+                    <a:lnR>
+                      <a:noFill/>
+                    </a:lnR>
+                    <a:lnT>
+                      <a:noFill/>
+                    </a:lnT>
+                    <a:lnB>
+                      <a:noFill/>
+                    </a:lnB>
+                  </a:tcPr>
+                </a:tc>
+                <a:tc>
+                  <a:txBody>
+                    <a:bodyPr/>
+                    <a:lstStyle/>
+                    <a:p>
+                      <a:pPr algn="ctr" fontAlgn="ctr"/>
+                      <a:r>
+                        <a:rPr lang="fr-FR" sz="1100" b="0" i="0" u="none" strike="noStrike" dirty="0">
+                          <a:solidFill>
+                            <a:srgbClr val="000000"/>
+                          </a:solidFill>
+                          <a:effectLst/>
+                          <a:latin typeface="Calibri Light" panose="020F0302020204030204" pitchFamily="34" charset="0"/>
+                        </a:rPr>
+                        <a:t>Avec</a:t>
+                      </a:r>
+                    </a:p>
+                  </a:txBody>
+                  <a:tcPr marL="0" marR="0" marT="0" marB="0" anchor="ctr">
+                    <a:lnL>
+                      <a:noFill/>
+                    </a:lnL>
+                    <a:lnR>
+                      <a:noFill/>
+                    </a:lnR>
+                    <a:lnT>
+                      <a:noFill/>
+                    </a:lnT>
+                    <a:lnB>
+                      <a:noFill/>
+                    </a:lnB>
+                  </a:tcPr>
+                </a:tc>
+                <a:tc>
+                  <a:txBody>
+                    <a:bodyPr/>
+                    <a:lstStyle/>
+                    <a:p>
+                      <a:pPr algn="ctr" fontAlgn="ctr"/>
+                      <a:r>
+                        <a:rPr lang="fr-FR" sz="1100" b="0" i="0" u="none" strike="noStrike" dirty="0">
+                          <a:solidFill>
+                            <a:srgbClr val="000000"/>
+                          </a:solidFill>
+                          <a:effectLst/>
+                          <a:latin typeface="Calibri Light" panose="020F0302020204030204" pitchFamily="34" charset="0"/>
+                        </a:rPr>
+                        <a:t>Super rideau</a:t>
+                      </a:r>
+                    </a:p>
+                  </a:txBody>
+                  <a:tcPr marL="0" marR="0" marT="0" marB="0" anchor="ctr">
+                    <a:lnL>
+                      <a:noFill/>
+                    </a:lnL>
+                    <a:lnR>
+                      <a:noFill/>
+                    </a:lnR>
+                    <a:lnT>
+                      <a:noFill/>
+                    </a:lnT>
+                    <a:lnB>
+                      <a:noFill/>
+                    </a:lnB>
+                  </a:tcPr>
+                </a:tc>
+                <a:extLst>
+                  <a:ext uri="{0D108BD9-81ED-4DB2-BD59-A6C34878D82A}">
+                    <a16:rowId xmlns:a16="http://schemas.microsoft.com/office/drawing/2014/main" val="3372922272"/>
+                  </a:ext>
+                </a:extLst>
+              </a:tr>
+            </a:tbl>
+          </a:graphicData>
+        </a:graphic>
+      </p:graphicFrame>
+      <p:graphicFrame>
+        <p:nvGraphicFramePr>
+          <p:cNvPr id="8" name="tableauSols">
+            <a:extLst>
+              <a:ext uri="{FF2B5EF4-FFF2-40B4-BE49-F238E27FC236}">
+                <a16:creationId xmlns:a16="http://schemas.microsoft.com/office/drawing/2014/main" id="{838FCDD2-4F30-2483-EFC3-69D4F00C5EA5}"/>
+              </a:ext>
+            </a:extLst>
+          </p:cNvPr>
+          <p:cNvGraphicFramePr>
+            <a:graphicFrameLocks noGrp="1"/>
+          </p:cNvGraphicFramePr>
+          <p:nvPr>
+            <p:extLst>
+              <p:ext uri="{D42A27DB-BD31-4B8C-83A1-F6EECF244321}">
+                <p14:modId xmlns:p14="http://schemas.microsoft.com/office/powerpoint/2010/main" val="241841151"/>
+              </p:ext>
+            </p:extLst>
+          </p:nvPr>
+        </p:nvGraphicFramePr>
+        <p:xfrm>
+          <a:off x="240862" y="3332339"/>
+          <a:ext cx="5855137" cy="685800"/>
+        </p:xfrm>
+        <a:graphic>
+          <a:graphicData uri="http://schemas.openxmlformats.org/drawingml/2006/table">
+            <a:tbl>
+              <a:tblPr/>
+              <a:tblGrid>
+                <a:gridCol w="2117553">
+                  <a:extLst>
+                    <a:ext uri="{9D8B030D-6E8A-4147-A177-3AD203B41FA5}">
+                      <a16:colId xmlns:a16="http://schemas.microsoft.com/office/drawing/2014/main" val="75992090"/>
+                    </a:ext>
+                  </a:extLst>
+                </a:gridCol>
+                <a:gridCol w="1097839">
+                  <a:extLst>
+                    <a:ext uri="{9D8B030D-6E8A-4147-A177-3AD203B41FA5}">
+                      <a16:colId xmlns:a16="http://schemas.microsoft.com/office/drawing/2014/main" val="1316683716"/>
+                    </a:ext>
+                  </a:extLst>
+                </a:gridCol>
+                <a:gridCol w="1184185">
+                  <a:extLst>
+                    <a:ext uri="{9D8B030D-6E8A-4147-A177-3AD203B41FA5}">
+                      <a16:colId xmlns:a16="http://schemas.microsoft.com/office/drawing/2014/main" val="2861349103"/>
+                    </a:ext>
+                  </a:extLst>
+                </a:gridCol>
+                <a:gridCol w="1455560">
+                  <a:extLst>
+                    <a:ext uri="{9D8B030D-6E8A-4147-A177-3AD203B41FA5}">
+                      <a16:colId xmlns:a16="http://schemas.microsoft.com/office/drawing/2014/main" val="753739910"/>
+                    </a:ext>
+                  </a:extLst>
+                </a:gridCol>
+              </a:tblGrid>
+              <a:tr h="182880">
+                <a:tc gridSpan="4">
+                  <a:txBody>
+                    <a:bodyPr/>
+                    <a:lstStyle/>
+                    <a:p>
+                      <a:pPr algn="ctr" fontAlgn="ctr"/>
+                      <a:r>
+                        <a:rPr lang="fr-FR" sz="1100" b="1" i="0" u="none" strike="noStrike" dirty="0">
+                          <a:solidFill>
+                            <a:srgbClr val="FFFFFF"/>
+                          </a:solidFill>
+                          <a:effectLst/>
+                          <a:latin typeface="Calibri Light" panose="020F0302020204030204" pitchFamily="34" charset="0"/>
+                        </a:rPr>
+                        <a:t>SOLS</a:t>
+                      </a:r>
+                    </a:p>
+                  </a:txBody>
+                  <a:tcPr marL="0" marR="0" marT="0" marB="0" anchor="ctr">
+                    <a:lnL>
+                      <a:noFill/>
+                    </a:lnL>
+                    <a:lnR>
+                      <a:noFill/>
+                    </a:lnR>
+                    <a:lnT>
+                      <a:noFill/>
+                    </a:lnT>
+                    <a:lnB>
+                      <a:noFill/>
+                    </a:lnB>
+                    <a:solidFill>
+                      <a:srgbClr val="BF3FFF"/>
+                    </a:solidFill>
+                  </a:tcPr>
+                </a:tc>
+                <a:tc hMerge="1">
+                  <a:txBody>
+                    <a:bodyPr/>
+                    <a:lstStyle/>
+                    <a:p>
+                      <a:endParaRPr lang="fr-FR"/>
+                    </a:p>
+                  </a:txBody>
+                  <a:tcPr/>
+                </a:tc>
+                <a:tc hMerge="1">
+                  <a:txBody>
+                    <a:bodyPr/>
+                    <a:lstStyle/>
+                    <a:p>
+                      <a:endParaRPr lang="fr-FR"/>
+                    </a:p>
+                  </a:txBody>
+                  <a:tcPr/>
+                </a:tc>
+                <a:tc hMerge="1">
+                  <a:txBody>
+                    <a:bodyPr/>
+                    <a:lstStyle/>
+                    <a:p>
+                      <a:endParaRPr lang="fr-FR"/>
+                    </a:p>
+                  </a:txBody>
+                  <a:tcPr/>
+                </a:tc>
+                <a:extLst>
+                  <a:ext uri="{0D108BD9-81ED-4DB2-BD59-A6C34878D82A}">
+                    <a16:rowId xmlns:a16="http://schemas.microsoft.com/office/drawing/2014/main" val="1203867552"/>
+                  </a:ext>
+                </a:extLst>
+              </a:tr>
+              <a:tr h="121920">
+                <a:tc>
+                  <a:txBody>
+                    <a:bodyPr/>
+                    <a:lstStyle/>
+                    <a:p>
+                      <a:pPr algn="l" fontAlgn="b"/>
+                      <a:endParaRPr lang="fr-FR" sz="1100" b="0" i="0" u="none" strike="noStrike">
+                        <a:solidFill>
+                          <a:srgbClr val="000000"/>
+                        </a:solidFill>
+                        <a:effectLst/>
+                        <a:latin typeface="Calibri Light" panose="020F0302020204030204" pitchFamily="34" charset="0"/>
+                      </a:endParaRPr>
+                    </a:p>
+                  </a:txBody>
+                  <a:tcPr marL="0" marR="0" marT="0" marB="0" anchor="b">
+                    <a:lnL>
+                      <a:noFill/>
+                    </a:lnL>
+                    <a:lnR>
+                      <a:noFill/>
+                    </a:lnR>
+                    <a:lnT>
+                      <a:noFill/>
+                    </a:lnT>
+                    <a:lnB>
+                      <a:noFill/>
+                    </a:lnB>
+                  </a:tcPr>
+                </a:tc>
+                <a:tc>
+                  <a:txBody>
+                    <a:bodyPr/>
+                    <a:lstStyle/>
+                    <a:p>
+                      <a:pPr algn="l" fontAlgn="b"/>
+                      <a:endParaRPr lang="fr-FR" sz="1100" b="0" i="0" u="none" strike="noStrike">
+                        <a:solidFill>
+                          <a:srgbClr val="000000"/>
+                        </a:solidFill>
+                        <a:effectLst/>
+                        <a:latin typeface="Calibri Light" panose="020F0302020204030204" pitchFamily="34" charset="0"/>
+                      </a:endParaRPr>
+                    </a:p>
+                  </a:txBody>
+                  <a:tcPr marL="0" marR="0" marT="0" marB="0" anchor="b">
+                    <a:lnL>
+                      <a:noFill/>
+                    </a:lnL>
+                    <a:lnR>
+                      <a:noFill/>
+                    </a:lnR>
+                    <a:lnT>
+                      <a:noFill/>
+                    </a:lnT>
+                    <a:lnB>
+                      <a:noFill/>
+                    </a:lnB>
+                  </a:tcPr>
+                </a:tc>
+                <a:tc>
+                  <a:txBody>
+                    <a:bodyPr/>
+                    <a:lstStyle/>
+                    <a:p>
+                      <a:pPr algn="l" fontAlgn="b"/>
+                      <a:endParaRPr lang="fr-FR" sz="1100" b="0" i="0" u="none" strike="noStrike">
+                        <a:solidFill>
+                          <a:srgbClr val="000000"/>
+                        </a:solidFill>
+                        <a:effectLst/>
+                        <a:latin typeface="Calibri Light" panose="020F0302020204030204" pitchFamily="34" charset="0"/>
+                      </a:endParaRPr>
+                    </a:p>
+                  </a:txBody>
+                  <a:tcPr marL="0" marR="0" marT="0" marB="0" anchor="b">
+                    <a:lnL>
+                      <a:noFill/>
+                    </a:lnL>
+                    <a:lnR>
+                      <a:noFill/>
+                    </a:lnR>
+                    <a:lnT>
+                      <a:noFill/>
+                    </a:lnT>
+                    <a:lnB>
+                      <a:noFill/>
+                    </a:lnB>
+                  </a:tcPr>
+                </a:tc>
+                <a:tc>
+                  <a:txBody>
+                    <a:bodyPr/>
+                    <a:lstStyle/>
+                    <a:p>
+                      <a:pPr algn="l" fontAlgn="b"/>
+                      <a:endParaRPr lang="fr-FR" sz="1100" b="0" i="0" u="none" strike="noStrike">
+                        <a:solidFill>
+                          <a:srgbClr val="000000"/>
+                        </a:solidFill>
+                        <a:effectLst/>
+                        <a:latin typeface="Calibri Light" panose="020F0302020204030204" pitchFamily="34" charset="0"/>
+                      </a:endParaRPr>
+                    </a:p>
+                  </a:txBody>
+                  <a:tcPr marL="0" marR="0" marT="0" marB="0" anchor="b">
+                    <a:lnL>
+                      <a:noFill/>
+                    </a:lnL>
+                    <a:lnR>
+                      <a:noFill/>
+                    </a:lnR>
+                    <a:lnT>
+                      <a:noFill/>
+                    </a:lnT>
+                    <a:lnB>
+                      <a:noFill/>
+                    </a:lnB>
+                  </a:tcPr>
+                </a:tc>
+                <a:extLst>
+                  <a:ext uri="{0D108BD9-81ED-4DB2-BD59-A6C34878D82A}">
+                    <a16:rowId xmlns:a16="http://schemas.microsoft.com/office/drawing/2014/main" val="965455136"/>
+                  </a:ext>
+                </a:extLst>
+              </a:tr>
+              <a:tr h="182880">
+                <a:tc>
+                  <a:txBody>
+                    <a:bodyPr/>
+                    <a:lstStyle/>
+                    <a:p>
+                      <a:pPr algn="ctr" fontAlgn="ctr"/>
+                      <a:r>
+                        <a:rPr lang="fr-FR" sz="1100" b="1" i="0" u="none" strike="noStrike" dirty="0">
+                          <a:solidFill>
+                            <a:srgbClr val="BF8F00"/>
+                          </a:solidFill>
+                          <a:effectLst/>
+                          <a:latin typeface="Calibri Light" panose="020F0302020204030204" pitchFamily="34" charset="0"/>
+                        </a:rPr>
+                        <a:t>CLASSES ET SALLES ANNEXES</a:t>
+                      </a:r>
+                    </a:p>
+                  </a:txBody>
+                  <a:tcPr marL="0" marR="0" marT="0" marB="0" anchor="ctr">
+                    <a:lnL>
+                      <a:noFill/>
+                    </a:lnL>
+                    <a:lnR>
+                      <a:noFill/>
+                    </a:lnR>
+                    <a:lnT>
+                      <a:noFill/>
+                    </a:lnT>
+                    <a:lnB>
+                      <a:noFill/>
+                    </a:lnB>
+                  </a:tcPr>
+                </a:tc>
+                <a:tc>
+                  <a:txBody>
+                    <a:bodyPr/>
+                    <a:lstStyle/>
+                    <a:p>
+                      <a:pPr algn="ctr" fontAlgn="ctr"/>
+                      <a:r>
+                        <a:rPr lang="fr-FR" sz="1100" b="0" i="0" u="none" strike="noStrike" dirty="0">
+                          <a:solidFill>
+                            <a:srgbClr val="000000"/>
+                          </a:solidFill>
+                          <a:effectLst/>
+                          <a:latin typeface="Calibri Light" panose="020F0302020204030204" pitchFamily="34" charset="0"/>
+                        </a:rPr>
+                        <a:t>terre plein</a:t>
+                      </a:r>
+                    </a:p>
+                  </a:txBody>
+                  <a:tcPr marL="0" marR="0" marT="0" marB="0" anchor="ctr">
+                    <a:lnL>
+                      <a:noFill/>
+                    </a:lnL>
+                    <a:lnR>
+                      <a:noFill/>
+                    </a:lnR>
+                    <a:lnT>
+                      <a:noFill/>
+                    </a:lnT>
+                    <a:lnB>
+                      <a:noFill/>
+                    </a:lnB>
+                  </a:tcPr>
+                </a:tc>
+                <a:tc>
+                  <a:txBody>
+                    <a:bodyPr/>
+                    <a:lstStyle/>
+                    <a:p>
+                      <a:pPr algn="ctr" fontAlgn="ctr"/>
+                      <a:r>
+                        <a:rPr lang="fr-FR" sz="1100" b="0" i="0" u="none" strike="noStrike" dirty="0">
+                          <a:solidFill>
+                            <a:srgbClr val="000000"/>
+                          </a:solidFill>
+                          <a:effectLst/>
+                          <a:latin typeface="Calibri Light" panose="020F0302020204030204" pitchFamily="34" charset="0"/>
+                        </a:rPr>
+                        <a:t>probablement non isolé</a:t>
+                      </a:r>
+                    </a:p>
+                  </a:txBody>
+                  <a:tcPr marL="0" marR="0" marT="0" marB="0" anchor="ctr">
+                    <a:lnL>
+                      <a:noFill/>
+                    </a:lnL>
+                    <a:lnR>
+                      <a:noFill/>
+                    </a:lnR>
+                    <a:lnT>
+                      <a:noFill/>
+                    </a:lnT>
+                    <a:lnB>
+                      <a:noFill/>
+                    </a:lnB>
+                  </a:tcPr>
+                </a:tc>
+                <a:tc>
+                  <a:txBody>
+                    <a:bodyPr/>
+                    <a:lstStyle/>
+                    <a:p>
+                      <a:pPr algn="ctr" fontAlgn="ctr"/>
+                      <a:r>
+                        <a:rPr lang="fr-FR" sz="1100" b="0" i="0" u="none" strike="noStrike">
+                          <a:solidFill>
+                            <a:srgbClr val="000000"/>
+                          </a:solidFill>
+                          <a:effectLst/>
+                          <a:latin typeface="Calibri Light" panose="020F0302020204030204" pitchFamily="34" charset="0"/>
+                        </a:rPr>
+                        <a:t>sdf</a:t>
+                      </a:r>
+                      <a:endParaRPr lang="fr-FR" sz="1100" b="0" i="0" u="none" strike="noStrike" dirty="0">
+                        <a:solidFill>
+                          <a:srgbClr val="000000"/>
+                        </a:solidFill>
+                        <a:effectLst/>
+                        <a:latin typeface="Calibri Light" panose="020F0302020204030204" pitchFamily="34" charset="0"/>
+                      </a:endParaRPr>
+                    </a:p>
+                  </a:txBody>
+                  <a:tcPr marL="0" marR="0" marT="0" marB="0" anchor="ctr">
+                    <a:lnL>
+                      <a:noFill/>
+                    </a:lnL>
+                    <a:lnR>
+                      <a:noFill/>
+                    </a:lnR>
+                    <a:lnT>
+                      <a:noFill/>
+                    </a:lnT>
+                    <a:lnB>
+                      <a:noFill/>
+                    </a:lnB>
+                  </a:tcPr>
+                </a:tc>
+                <a:extLst>
+                  <a:ext uri="{0D108BD9-81ED-4DB2-BD59-A6C34878D82A}">
+                    <a16:rowId xmlns:a16="http://schemas.microsoft.com/office/drawing/2014/main" val="329930189"/>
+                  </a:ext>
+                </a:extLst>
+              </a:tr>
+            </a:tbl>
+          </a:graphicData>
+        </a:graphic>
+      </p:graphicFrame>
     </p:spTree>
     <p:extLst>
       <p:ext uri="{BB962C8B-B14F-4D97-AF65-F5344CB8AC3E}">

</xml_diff>

<commit_message>
Changement des police par défault pour les cellules vide  #29
</commit_message>
<xml_diff>
--- a/app/src/test/resources/powerpointvierge.pptx
+++ b/app/src/test/resources/powerpointvierge.pptx
@@ -1450,6 +1450,7 @@
                 <a:solidFill>
                   <a:schemeClr val="bg1"/>
                 </a:solidFill>
+                <a:latin typeface="+mj-lt"/>
               </a:rPr>
               <a:t>Lorem</a:t>
             </a:r>
@@ -1587,7 +1588,9 @@
           <a:lstStyle/>
           <a:p>
             <a:r>
-              <a:rPr lang="fr-FR" sz="1600" dirty="0"/>
+              <a:rPr lang="fr-FR" sz="1600" dirty="0">
+                <a:latin typeface="+mj-lt"/>
+              </a:rPr>
               <a:t>Lorem</a:t>
             </a:r>
           </a:p>
@@ -1622,7 +1625,9 @@
           <a:lstStyle/>
           <a:p>
             <a:r>
-              <a:rPr lang="fr-FR" sz="1600" dirty="0"/>
+              <a:rPr lang="fr-FR" sz="1600" dirty="0">
+                <a:latin typeface="+mj-lt"/>
+              </a:rPr>
               <a:t> Lorem</a:t>
             </a:r>
           </a:p>
@@ -1657,7 +1662,9 @@
           <a:lstStyle/>
           <a:p>
             <a:r>
-              <a:rPr lang="fr-FR" sz="1600" dirty="0"/>
+              <a:rPr lang="fr-FR" sz="1600" dirty="0">
+                <a:latin typeface="+mj-lt"/>
+              </a:rPr>
               <a:t> Lorem</a:t>
             </a:r>
           </a:p>
@@ -1737,7 +1744,9 @@
           <a:lstStyle/>
           <a:p>
             <a:r>
-              <a:rPr lang="fr-FR" sz="1600" dirty="0"/>
+              <a:rPr lang="fr-FR" sz="1600" dirty="0">
+                <a:latin typeface="+mj-lt"/>
+              </a:rPr>
               <a:t> Lorem</a:t>
             </a:r>
           </a:p>
@@ -1779,6 +1788,7 @@
                 <a:solidFill>
                   <a:schemeClr val="bg1"/>
                 </a:solidFill>
+                <a:latin typeface="+mj-lt"/>
               </a:rPr>
               <a:t>Lorem</a:t>
             </a:r>
@@ -9598,7 +9608,7 @@
         <p:spPr>
           <a:xfrm>
             <a:off x="11146521" y="6532953"/>
-            <a:ext cx="1045479" cy="338554"/>
+            <a:ext cx="928075" cy="338554"/>
           </a:xfrm>
           <a:prstGeom prst="rect">
             <a:avLst/>
@@ -9613,7 +9623,9 @@
           <a:p>
             <a:pPr algn="l"/>
             <a:r>
-              <a:rPr lang="fr-FR" sz="1600" u="sng" dirty="0"/>
+              <a:rPr lang="fr-FR" sz="1600" u="sng" dirty="0">
+                <a:latin typeface="+mj-lt"/>
+              </a:rPr>
               <a:t>A vérifier</a:t>
             </a:r>
           </a:p>
@@ -16982,76 +16994,16 @@
         <a:srgbClr val="954F72"/>
       </a:folHlink>
     </a:clrScheme>
-    <a:fontScheme name="Century Gothic">
+    <a:fontScheme name="super polices">
       <a:majorFont>
-        <a:latin typeface="Century Gothic" panose="020F0302020204030204"/>
+        <a:latin typeface="Calibri Light"/>
         <a:ea typeface=""/>
         <a:cs typeface=""/>
-        <a:font script="Jpan" typeface="メイリオ"/>
-        <a:font script="Hang" typeface="맑은 고딕"/>
-        <a:font script="Hans" typeface="宋体"/>
-        <a:font script="Hant" typeface="新細明體"/>
-        <a:font script="Arab" typeface="Times New Roman"/>
-        <a:font script="Hebr" typeface="Times New Roman"/>
-        <a:font script="Thai" typeface="Angsana New"/>
-        <a:font script="Ethi" typeface="Nyala"/>
-        <a:font script="Beng" typeface="Vrinda"/>
-        <a:font script="Gujr" typeface="Shruti"/>
-        <a:font script="Khmr" typeface="MoolBoran"/>
-        <a:font script="Knda" typeface="Tunga"/>
-        <a:font script="Guru" typeface="Raavi"/>
-        <a:font script="Cans" typeface="Euphemia"/>
-        <a:font script="Cher" typeface="Plantagenet Cherokee"/>
-        <a:font script="Yiii" typeface="Microsoft Yi Baiti"/>
-        <a:font script="Tibt" typeface="Microsoft Himalaya"/>
-        <a:font script="Thaa" typeface="MV Boli"/>
-        <a:font script="Deva" typeface="Mangal"/>
-        <a:font script="Telu" typeface="Gautami"/>
-        <a:font script="Taml" typeface="Latha"/>
-        <a:font script="Syrc" typeface="Estrangelo Edessa"/>
-        <a:font script="Orya" typeface="Kalinga"/>
-        <a:font script="Mlym" typeface="Kartika"/>
-        <a:font script="Laoo" typeface="DokChampa"/>
-        <a:font script="Sinh" typeface="Iskoola Pota"/>
-        <a:font script="Mong" typeface="Mongolian Baiti"/>
-        <a:font script="Viet" typeface="Times New Roman"/>
-        <a:font script="Uigh" typeface="Microsoft Uighur"/>
-        <a:font script="Geor" typeface="Sylfaen"/>
       </a:majorFont>
       <a:minorFont>
-        <a:latin typeface="Century Gothic" panose="020F0302020204030204"/>
+        <a:latin typeface="Calibri Light"/>
         <a:ea typeface=""/>
         <a:cs typeface=""/>
-        <a:font script="Jpan" typeface="メイリオ"/>
-        <a:font script="Hang" typeface="맑은 고딕"/>
-        <a:font script="Hans" typeface="宋体"/>
-        <a:font script="Hant" typeface="新細明體"/>
-        <a:font script="Arab" typeface="Arial"/>
-        <a:font script="Hebr" typeface="Arial"/>
-        <a:font script="Thai" typeface="Cordia New"/>
-        <a:font script="Ethi" typeface="Nyala"/>
-        <a:font script="Beng" typeface="Vrinda"/>
-        <a:font script="Gujr" typeface="Shruti"/>
-        <a:font script="Khmr" typeface="DaunPenh"/>
-        <a:font script="Knda" typeface="Tunga"/>
-        <a:font script="Guru" typeface="Raavi"/>
-        <a:font script="Cans" typeface="Euphemia"/>
-        <a:font script="Cher" typeface="Plantagenet Cherokee"/>
-        <a:font script="Yiii" typeface="Microsoft Yi Baiti"/>
-        <a:font script="Tibt" typeface="Microsoft Himalaya"/>
-        <a:font script="Thaa" typeface="MV Boli"/>
-        <a:font script="Deva" typeface="Mangal"/>
-        <a:font script="Telu" typeface="Gautami"/>
-        <a:font script="Taml" typeface="Latha"/>
-        <a:font script="Syrc" typeface="Estrangelo Edessa"/>
-        <a:font script="Orya" typeface="Kalinga"/>
-        <a:font script="Mlym" typeface="Kartika"/>
-        <a:font script="Laoo" typeface="DokChampa"/>
-        <a:font script="Sinh" typeface="Iskoola Pota"/>
-        <a:font script="Mong" typeface="Mongolian Baiti"/>
-        <a:font script="Viet" typeface="Arial"/>
-        <a:font script="Uigh" typeface="Microsoft Uighur"/>
-        <a:font script="Geor" typeface="Sylfaen"/>
       </a:minorFont>
     </a:fontScheme>
     <a:fmtScheme name="Office">

</xml_diff>

<commit_message>
Couleur du text par défaut #34
</commit_message>
<xml_diff>
--- a/app/src/test/resources/powerpointvierge.pptx
+++ b/app/src/test/resources/powerpointvierge.pptx
@@ -1580,7 +1580,7 @@
             <a:avLst/>
           </a:prstGeom>
           <a:solidFill>
-            <a:schemeClr val="tx1"/>
+            <a:srgbClr val="004C64"/>
           </a:solidFill>
           <a:ln>
             <a:solidFill>
@@ -1923,7 +1923,7 @@
             <a:avLst/>
           </a:prstGeom>
           <a:solidFill>
-            <a:schemeClr val="tx1"/>
+            <a:srgbClr val="004C64"/>
           </a:solidFill>
         </p:spPr>
         <p:txBody>
@@ -6443,7 +6443,7 @@
             <a:avLst/>
           </a:prstGeom>
           <a:solidFill>
-            <a:schemeClr val="tx1"/>
+            <a:srgbClr val="004C64"/>
           </a:solidFill>
         </p:spPr>
         <p:txBody>
@@ -9764,7 +9764,7 @@
             <a:avLst/>
           </a:prstGeom>
           <a:solidFill>
-            <a:schemeClr val="tx1"/>
+            <a:srgbClr val="004C64"/>
           </a:solidFill>
         </p:spPr>
         <p:txBody>
@@ -9823,7 +9823,7 @@
             <a:avLst/>
           </a:prstGeom>
           <a:solidFill>
-            <a:schemeClr val="tx1"/>
+            <a:srgbClr val="004C64"/>
           </a:solidFill>
         </p:spPr>
         <p:txBody>
@@ -9888,7 +9888,7 @@
             <a:avLst/>
           </a:prstGeom>
           <a:solidFill>
-            <a:schemeClr val="tx1"/>
+            <a:srgbClr val="004C64"/>
           </a:solidFill>
         </p:spPr>
         <p:txBody>
@@ -11038,7 +11038,7 @@
             <a:avLst/>
           </a:prstGeom>
           <a:solidFill>
-            <a:schemeClr val="tx1"/>
+            <a:srgbClr val="004C64"/>
           </a:solidFill>
         </p:spPr>
         <p:txBody>
@@ -13237,7 +13237,7 @@
             <a:avLst/>
           </a:prstGeom>
           <a:solidFill>
-            <a:schemeClr val="tx1"/>
+            <a:srgbClr val="004C64"/>
           </a:solidFill>
         </p:spPr>
         <p:txBody>
@@ -14470,7 +14470,7 @@
             <a:avLst/>
           </a:prstGeom>
           <a:solidFill>
-            <a:schemeClr val="tx1"/>
+            <a:srgbClr val="004C64"/>
           </a:solidFill>
         </p:spPr>
         <p:txBody>
@@ -16123,9 +16123,9 @@
 <file path=ppt/theme/theme1.xml><?xml version="1.0" encoding="utf-8"?>
 <a:theme xmlns:a="http://schemas.openxmlformats.org/drawingml/2006/main" name="1_Thème Office">
   <a:themeElements>
-    <a:clrScheme name="Modele">
+    <a:clrScheme name="Personnalisé 1">
       <a:dk1>
-        <a:srgbClr val="004353"/>
+        <a:srgbClr val="222B35"/>
       </a:dk1>
       <a:lt1>
         <a:srgbClr val="FFFFFF"/>

</xml_diff>

<commit_message>
Changement d'emplacement de la remarque pour l'enveloppe
</commit_message>
<xml_diff>
--- a/app/src/test/resources/powerpointvierge.pptx
+++ b/app/src/test/resources/powerpointvierge.pptx
@@ -11031,8 +11031,8 @@
         </p:nvSpPr>
         <p:spPr>
           <a:xfrm>
-            <a:off x="6436824" y="5253369"/>
-            <a:ext cx="5505452" cy="338554"/>
+            <a:off x="249724" y="5419393"/>
+            <a:ext cx="5855136" cy="338554"/>
           </a:xfrm>
           <a:prstGeom prst="rect">
             <a:avLst/>
@@ -13043,8 +13043,8 @@
         </p:nvSpPr>
         <p:spPr>
           <a:xfrm>
-            <a:off x="6436822" y="1006729"/>
-            <a:ext cx="5505453" cy="4224490"/>
+            <a:off x="6436822" y="1006728"/>
+            <a:ext cx="5505453" cy="5631635"/>
           </a:xfrm>
           <a:prstGeom prst="rect">
             <a:avLst/>

</xml_diff>